<commit_message>
checklist reordering + fixes
</commit_message>
<xml_diff>
--- a/Computer Science Discoveries/Projects/Project 3/Project 3 Checklist.pptx
+++ b/Computer Science Discoveries/Projects/Project 3/Project 3 Checklist.pptx
@@ -8,18 +8,19 @@
     <p:sldId id="256" r:id="rId5"/>
     <p:sldId id="261" r:id="rId6"/>
     <p:sldId id="257" r:id="rId7"/>
-    <p:sldId id="258" r:id="rId8"/>
-    <p:sldId id="265" r:id="rId9"/>
-    <p:sldId id="259" r:id="rId10"/>
-    <p:sldId id="266" r:id="rId11"/>
-    <p:sldId id="260" r:id="rId12"/>
-    <p:sldId id="267" r:id="rId13"/>
-    <p:sldId id="262" r:id="rId14"/>
-    <p:sldId id="268" r:id="rId15"/>
-    <p:sldId id="269" r:id="rId16"/>
-    <p:sldId id="263" r:id="rId17"/>
-    <p:sldId id="270" r:id="rId18"/>
-    <p:sldId id="264" r:id="rId19"/>
+    <p:sldId id="271" r:id="rId8"/>
+    <p:sldId id="258" r:id="rId9"/>
+    <p:sldId id="265" r:id="rId10"/>
+    <p:sldId id="259" r:id="rId11"/>
+    <p:sldId id="266" r:id="rId12"/>
+    <p:sldId id="262" r:id="rId13"/>
+    <p:sldId id="268" r:id="rId14"/>
+    <p:sldId id="269" r:id="rId15"/>
+    <p:sldId id="260" r:id="rId16"/>
+    <p:sldId id="267" r:id="rId17"/>
+    <p:sldId id="263" r:id="rId18"/>
+    <p:sldId id="270" r:id="rId19"/>
+    <p:sldId id="264" r:id="rId20"/>
   </p:sldIdLst>
   <p:sldSz cx="12192000" cy="6858000"/>
   <p:notesSz cx="6858000" cy="9144000"/>
@@ -130,8 +131,8 @@
 <pc:chgInfo xmlns:a="http://schemas.openxmlformats.org/drawingml/2006/main" xmlns:r="http://schemas.openxmlformats.org/officeDocument/2006/relationships" xmlns:ac="http://schemas.microsoft.com/office/drawing/2013/main/command" xmlns:pc="http://schemas.microsoft.com/office/powerpoint/2013/main/command">
   <pc:docChgLst>
     <pc:chgData name="Joshua Gross" userId="7bb6a70e-9d37-46e4-96de-748557707bd0" providerId="ADAL" clId="{C4CD2F8B-4DF7-4CBE-9333-F4F03BBCBE6E}"/>
-    <pc:docChg chg="undo custSel addSld modSld">
-      <pc:chgData name="Joshua Gross" userId="7bb6a70e-9d37-46e4-96de-748557707bd0" providerId="ADAL" clId="{C4CD2F8B-4DF7-4CBE-9333-F4F03BBCBE6E}" dt="2023-09-26T13:15:45.714" v="2414" actId="1076"/>
+    <pc:docChg chg="undo custSel addSld modSld sldOrd">
+      <pc:chgData name="Joshua Gross" userId="7bb6a70e-9d37-46e4-96de-748557707bd0" providerId="ADAL" clId="{C4CD2F8B-4DF7-4CBE-9333-F4F03BBCBE6E}" dt="2023-10-02T12:59:35.954" v="2653" actId="20577"/>
       <pc:docMkLst>
         <pc:docMk/>
       </pc:docMkLst>
@@ -284,12 +285,20 @@
           </ac:picMkLst>
         </pc:picChg>
       </pc:sldChg>
-      <pc:sldChg chg="addSp delSp modSp">
-        <pc:chgData name="Joshua Gross" userId="7bb6a70e-9d37-46e4-96de-748557707bd0" providerId="ADAL" clId="{C4CD2F8B-4DF7-4CBE-9333-F4F03BBCBE6E}" dt="2023-09-25T21:08:09.134" v="544" actId="478"/>
+      <pc:sldChg chg="addSp delSp modSp ord">
+        <pc:chgData name="Joshua Gross" userId="7bb6a70e-9d37-46e4-96de-748557707bd0" providerId="ADAL" clId="{C4CD2F8B-4DF7-4CBE-9333-F4F03BBCBE6E}" dt="2023-10-02T12:14:04.920" v="2619"/>
         <pc:sldMkLst>
           <pc:docMk/>
           <pc:sldMk cId="1152250863" sldId="260"/>
         </pc:sldMkLst>
+        <pc:spChg chg="mod">
+          <ac:chgData name="Joshua Gross" userId="7bb6a70e-9d37-46e4-96de-748557707bd0" providerId="ADAL" clId="{C4CD2F8B-4DF7-4CBE-9333-F4F03BBCBE6E}" dt="2023-10-02T12:14:00.920" v="2618" actId="20577"/>
+          <ac:spMkLst>
+            <pc:docMk/>
+            <pc:sldMk cId="1152250863" sldId="260"/>
+            <ac:spMk id="2" creationId="{A3B10D37-35D8-44FB-8C77-B3901EE3A4D3}"/>
+          </ac:spMkLst>
+        </pc:spChg>
         <pc:spChg chg="del">
           <ac:chgData name="Joshua Gross" userId="7bb6a70e-9d37-46e4-96de-748557707bd0" providerId="ADAL" clId="{C4CD2F8B-4DF7-4CBE-9333-F4F03BBCBE6E}" dt="2023-09-25T21:08:09.134" v="544" actId="478"/>
           <ac:spMkLst>
@@ -339,11 +348,19 @@
         </pc:picChg>
       </pc:sldChg>
       <pc:sldChg chg="addSp delSp modSp">
-        <pc:chgData name="Joshua Gross" userId="7bb6a70e-9d37-46e4-96de-748557707bd0" providerId="ADAL" clId="{C4CD2F8B-4DF7-4CBE-9333-F4F03BBCBE6E}" dt="2023-09-25T21:09:06.269" v="555" actId="1076"/>
+        <pc:chgData name="Joshua Gross" userId="7bb6a70e-9d37-46e4-96de-748557707bd0" providerId="ADAL" clId="{C4CD2F8B-4DF7-4CBE-9333-F4F03BBCBE6E}" dt="2023-10-02T12:58:26.609" v="2623" actId="732"/>
         <pc:sldMkLst>
           <pc:docMk/>
           <pc:sldMk cId="1597390541" sldId="262"/>
         </pc:sldMkLst>
+        <pc:spChg chg="mod">
+          <ac:chgData name="Joshua Gross" userId="7bb6a70e-9d37-46e4-96de-748557707bd0" providerId="ADAL" clId="{C4CD2F8B-4DF7-4CBE-9333-F4F03BBCBE6E}" dt="2023-10-02T12:13:51.063" v="2610" actId="20577"/>
+          <ac:spMkLst>
+            <pc:docMk/>
+            <pc:sldMk cId="1597390541" sldId="262"/>
+            <ac:spMk id="2" creationId="{A3B10D37-35D8-44FB-8C77-B3901EE3A4D3}"/>
+          </ac:spMkLst>
+        </pc:spChg>
         <pc:spChg chg="del">
           <ac:chgData name="Joshua Gross" userId="7bb6a70e-9d37-46e4-96de-748557707bd0" providerId="ADAL" clId="{C4CD2F8B-4DF7-4CBE-9333-F4F03BBCBE6E}" dt="2023-09-25T21:08:34.574" v="546" actId="478"/>
           <ac:spMkLst>
@@ -360,16 +377,16 @@
             <ac:picMk id="4" creationId="{E23F4A1F-72C7-4ADF-B7C1-B1F374F8A8BB}"/>
           </ac:picMkLst>
         </pc:picChg>
-        <pc:picChg chg="add mod">
-          <ac:chgData name="Joshua Gross" userId="7bb6a70e-9d37-46e4-96de-748557707bd0" providerId="ADAL" clId="{C4CD2F8B-4DF7-4CBE-9333-F4F03BBCBE6E}" dt="2023-09-25T21:08:39.814" v="549" actId="1076"/>
+        <pc:picChg chg="add mod modCrop">
+          <ac:chgData name="Joshua Gross" userId="7bb6a70e-9d37-46e4-96de-748557707bd0" providerId="ADAL" clId="{C4CD2F8B-4DF7-4CBE-9333-F4F03BBCBE6E}" dt="2023-10-02T12:58:20.281" v="2622" actId="732"/>
           <ac:picMkLst>
             <pc:docMk/>
             <pc:sldMk cId="1597390541" sldId="262"/>
             <ac:picMk id="5" creationId="{0BE2251C-899B-4125-BA01-392020058228}"/>
           </ac:picMkLst>
         </pc:picChg>
-        <pc:picChg chg="add mod">
-          <ac:chgData name="Joshua Gross" userId="7bb6a70e-9d37-46e4-96de-748557707bd0" providerId="ADAL" clId="{C4CD2F8B-4DF7-4CBE-9333-F4F03BBCBE6E}" dt="2023-09-25T21:09:06.269" v="555" actId="1076"/>
+        <pc:picChg chg="add mod modCrop">
+          <ac:chgData name="Joshua Gross" userId="7bb6a70e-9d37-46e4-96de-748557707bd0" providerId="ADAL" clId="{C4CD2F8B-4DF7-4CBE-9333-F4F03BBCBE6E}" dt="2023-10-02T12:58:26.609" v="2623" actId="732"/>
           <ac:picMkLst>
             <pc:docMk/>
             <pc:sldMk cId="1597390541" sldId="262"/>
@@ -409,13 +426,13 @@
         </pc:picChg>
       </pc:sldChg>
       <pc:sldChg chg="delSp modSp add">
-        <pc:chgData name="Joshua Gross" userId="7bb6a70e-9d37-46e4-96de-748557707bd0" providerId="ADAL" clId="{C4CD2F8B-4DF7-4CBE-9333-F4F03BBCBE6E}" dt="2023-09-25T21:13:27.339" v="1068" actId="20577"/>
+        <pc:chgData name="Joshua Gross" userId="7bb6a70e-9d37-46e4-96de-748557707bd0" providerId="ADAL" clId="{C4CD2F8B-4DF7-4CBE-9333-F4F03BBCBE6E}" dt="2023-10-02T12:59:35.954" v="2653" actId="20577"/>
         <pc:sldMkLst>
           <pc:docMk/>
           <pc:sldMk cId="1270120045" sldId="264"/>
         </pc:sldMkLst>
         <pc:spChg chg="mod">
-          <ac:chgData name="Joshua Gross" userId="7bb6a70e-9d37-46e4-96de-748557707bd0" providerId="ADAL" clId="{C4CD2F8B-4DF7-4CBE-9333-F4F03BBCBE6E}" dt="2023-09-25T21:00:28.522" v="59" actId="20577"/>
+          <ac:chgData name="Joshua Gross" userId="7bb6a70e-9d37-46e4-96de-748557707bd0" providerId="ADAL" clId="{C4CD2F8B-4DF7-4CBE-9333-F4F03BBCBE6E}" dt="2023-10-02T12:59:14.801" v="2651" actId="20577"/>
           <ac:spMkLst>
             <pc:docMk/>
             <pc:sldMk cId="1270120045" sldId="264"/>
@@ -423,7 +440,7 @@
           </ac:spMkLst>
         </pc:spChg>
         <pc:spChg chg="mod">
-          <ac:chgData name="Joshua Gross" userId="7bb6a70e-9d37-46e4-96de-748557707bd0" providerId="ADAL" clId="{C4CD2F8B-4DF7-4CBE-9333-F4F03BBCBE6E}" dt="2023-09-25T21:13:27.339" v="1068" actId="20577"/>
+          <ac:chgData name="Joshua Gross" userId="7bb6a70e-9d37-46e4-96de-748557707bd0" providerId="ADAL" clId="{C4CD2F8B-4DF7-4CBE-9333-F4F03BBCBE6E}" dt="2023-10-02T12:59:35.954" v="2653" actId="20577"/>
           <ac:spMkLst>
             <pc:docMk/>
             <pc:sldMk cId="1270120045" sldId="264"/>
@@ -440,7 +457,7 @@
         </pc:picChg>
       </pc:sldChg>
       <pc:sldChg chg="addSp delSp modSp add">
-        <pc:chgData name="Joshua Gross" userId="7bb6a70e-9d37-46e4-96de-748557707bd0" providerId="ADAL" clId="{C4CD2F8B-4DF7-4CBE-9333-F4F03BBCBE6E}" dt="2023-09-26T13:11:35.369" v="2225" actId="20577"/>
+        <pc:chgData name="Joshua Gross" userId="7bb6a70e-9d37-46e4-96de-748557707bd0" providerId="ADAL" clId="{C4CD2F8B-4DF7-4CBE-9333-F4F03BBCBE6E}" dt="2023-10-02T12:10:32.333" v="2561" actId="20577"/>
         <pc:sldMkLst>
           <pc:docMk/>
           <pc:sldMk cId="1399610798" sldId="265"/>
@@ -470,7 +487,7 @@
           </ac:spMkLst>
         </pc:spChg>
         <pc:spChg chg="add mod">
-          <ac:chgData name="Joshua Gross" userId="7bb6a70e-9d37-46e4-96de-748557707bd0" providerId="ADAL" clId="{C4CD2F8B-4DF7-4CBE-9333-F4F03BBCBE6E}" dt="2023-09-26T13:11:35.369" v="2225" actId="20577"/>
+          <ac:chgData name="Joshua Gross" userId="7bb6a70e-9d37-46e4-96de-748557707bd0" providerId="ADAL" clId="{C4CD2F8B-4DF7-4CBE-9333-F4F03BBCBE6E}" dt="2023-10-02T12:10:32.333" v="2561" actId="20577"/>
           <ac:spMkLst>
             <pc:docMk/>
             <pc:sldMk cId="1399610798" sldId="265"/>
@@ -581,14 +598,14 @@
           </ac:picMkLst>
         </pc:picChg>
       </pc:sldChg>
-      <pc:sldChg chg="addSp delSp modSp add">
-        <pc:chgData name="Joshua Gross" userId="7bb6a70e-9d37-46e4-96de-748557707bd0" providerId="ADAL" clId="{C4CD2F8B-4DF7-4CBE-9333-F4F03BBCBE6E}" dt="2023-09-26T13:11:53.246" v="2259" actId="20577"/>
+      <pc:sldChg chg="addSp delSp modSp add ord">
+        <pc:chgData name="Joshua Gross" userId="7bb6a70e-9d37-46e4-96de-748557707bd0" providerId="ADAL" clId="{C4CD2F8B-4DF7-4CBE-9333-F4F03BBCBE6E}" dt="2023-10-02T12:14:04.920" v="2619"/>
         <pc:sldMkLst>
           <pc:docMk/>
           <pc:sldMk cId="4197318355" sldId="267"/>
         </pc:sldMkLst>
         <pc:spChg chg="mod">
-          <ac:chgData name="Joshua Gross" userId="7bb6a70e-9d37-46e4-96de-748557707bd0" providerId="ADAL" clId="{C4CD2F8B-4DF7-4CBE-9333-F4F03BBCBE6E}" dt="2023-09-26T13:04:43.802" v="1913" actId="1076"/>
+          <ac:chgData name="Joshua Gross" userId="7bb6a70e-9d37-46e4-96de-748557707bd0" providerId="ADAL" clId="{C4CD2F8B-4DF7-4CBE-9333-F4F03BBCBE6E}" dt="2023-10-02T12:13:58.240" v="2616" actId="20577"/>
           <ac:spMkLst>
             <pc:docMk/>
             <pc:sldMk cId="4197318355" sldId="267"/>
@@ -612,7 +629,7 @@
           </ac:spMkLst>
         </pc:spChg>
         <pc:spChg chg="add mod">
-          <ac:chgData name="Joshua Gross" userId="7bb6a70e-9d37-46e4-96de-748557707bd0" providerId="ADAL" clId="{C4CD2F8B-4DF7-4CBE-9333-F4F03BBCBE6E}" dt="2023-09-26T13:11:53.246" v="2259" actId="20577"/>
+          <ac:chgData name="Joshua Gross" userId="7bb6a70e-9d37-46e4-96de-748557707bd0" providerId="ADAL" clId="{C4CD2F8B-4DF7-4CBE-9333-F4F03BBCBE6E}" dt="2023-10-02T12:11:35.306" v="2595" actId="20577"/>
           <ac:spMkLst>
             <pc:docMk/>
             <pc:sldMk cId="4197318355" sldId="267"/>
@@ -637,21 +654,37 @@
         </pc:picChg>
       </pc:sldChg>
       <pc:sldChg chg="addSp delSp modSp add">
-        <pc:chgData name="Joshua Gross" userId="7bb6a70e-9d37-46e4-96de-748557707bd0" providerId="ADAL" clId="{C4CD2F8B-4DF7-4CBE-9333-F4F03BBCBE6E}" dt="2023-09-26T13:12:26.572" v="2276" actId="1076"/>
+        <pc:chgData name="Joshua Gross" userId="7bb6a70e-9d37-46e4-96de-748557707bd0" providerId="ADAL" clId="{C4CD2F8B-4DF7-4CBE-9333-F4F03BBCBE6E}" dt="2023-10-02T12:58:33.033" v="2624" actId="732"/>
         <pc:sldMkLst>
           <pc:docMk/>
           <pc:sldMk cId="263100609" sldId="268"/>
         </pc:sldMkLst>
+        <pc:spChg chg="mod">
+          <ac:chgData name="Joshua Gross" userId="7bb6a70e-9d37-46e4-96de-748557707bd0" providerId="ADAL" clId="{C4CD2F8B-4DF7-4CBE-9333-F4F03BBCBE6E}" dt="2023-10-02T12:13:53.560" v="2612" actId="20577"/>
+          <ac:spMkLst>
+            <pc:docMk/>
+            <pc:sldMk cId="263100609" sldId="268"/>
+            <ac:spMk id="2" creationId="{A3B10D37-35D8-44FB-8C77-B3901EE3A4D3}"/>
+          </ac:spMkLst>
+        </pc:spChg>
         <pc:spChg chg="add mod">
-          <ac:chgData name="Joshua Gross" userId="7bb6a70e-9d37-46e4-96de-748557707bd0" providerId="ADAL" clId="{C4CD2F8B-4DF7-4CBE-9333-F4F03BBCBE6E}" dt="2023-09-26T13:12:26.572" v="2276" actId="1076"/>
+          <ac:chgData name="Joshua Gross" userId="7bb6a70e-9d37-46e4-96de-748557707bd0" providerId="ADAL" clId="{C4CD2F8B-4DF7-4CBE-9333-F4F03BBCBE6E}" dt="2023-10-02T12:13:42.144" v="2608" actId="20577"/>
+          <ac:spMkLst>
+            <pc:docMk/>
+            <pc:sldMk cId="263100609" sldId="268"/>
+            <ac:spMk id="6" creationId="{58FE0D21-5F4E-41D5-918E-98113CFDED0B}"/>
+          </ac:spMkLst>
+        </pc:spChg>
+        <pc:spChg chg="add del mod">
+          <ac:chgData name="Joshua Gross" userId="7bb6a70e-9d37-46e4-96de-748557707bd0" providerId="ADAL" clId="{C4CD2F8B-4DF7-4CBE-9333-F4F03BBCBE6E}" dt="2023-10-02T12:13:39.105" v="2600" actId="478"/>
           <ac:spMkLst>
             <pc:docMk/>
             <pc:sldMk cId="263100609" sldId="268"/>
             <ac:spMk id="7" creationId="{F76B2B67-6105-45C4-B62F-1B4566376CF0}"/>
           </ac:spMkLst>
         </pc:spChg>
-        <pc:picChg chg="mod">
-          <ac:chgData name="Joshua Gross" userId="7bb6a70e-9d37-46e4-96de-748557707bd0" providerId="ADAL" clId="{C4CD2F8B-4DF7-4CBE-9333-F4F03BBCBE6E}" dt="2023-09-26T13:11:19.916" v="2196" actId="1076"/>
+        <pc:picChg chg="mod modCrop">
+          <ac:chgData name="Joshua Gross" userId="7bb6a70e-9d37-46e4-96de-748557707bd0" providerId="ADAL" clId="{C4CD2F8B-4DF7-4CBE-9333-F4F03BBCBE6E}" dt="2023-10-02T12:58:33.033" v="2624" actId="732"/>
           <ac:picMkLst>
             <pc:docMk/>
             <pc:sldMk cId="263100609" sldId="268"/>
@@ -668,13 +701,21 @@
         </pc:picChg>
       </pc:sldChg>
       <pc:sldChg chg="addSp delSp modSp add">
-        <pc:chgData name="Joshua Gross" userId="7bb6a70e-9d37-46e4-96de-748557707bd0" providerId="ADAL" clId="{C4CD2F8B-4DF7-4CBE-9333-F4F03BBCBE6E}" dt="2023-09-26T13:12:49.068" v="2305" actId="20577"/>
+        <pc:chgData name="Joshua Gross" userId="7bb6a70e-9d37-46e4-96de-748557707bd0" providerId="ADAL" clId="{C4CD2F8B-4DF7-4CBE-9333-F4F03BBCBE6E}" dt="2023-10-02T12:58:39.665" v="2625" actId="732"/>
         <pc:sldMkLst>
           <pc:docMk/>
           <pc:sldMk cId="1922963660" sldId="269"/>
         </pc:sldMkLst>
         <pc:spChg chg="mod">
-          <ac:chgData name="Joshua Gross" userId="7bb6a70e-9d37-46e4-96de-748557707bd0" providerId="ADAL" clId="{C4CD2F8B-4DF7-4CBE-9333-F4F03BBCBE6E}" dt="2023-09-26T13:12:49.068" v="2305" actId="20577"/>
+          <ac:chgData name="Joshua Gross" userId="7bb6a70e-9d37-46e4-96de-748557707bd0" providerId="ADAL" clId="{C4CD2F8B-4DF7-4CBE-9333-F4F03BBCBE6E}" dt="2023-10-02T12:13:55.167" v="2614" actId="20577"/>
+          <ac:spMkLst>
+            <pc:docMk/>
+            <pc:sldMk cId="1922963660" sldId="269"/>
+            <ac:spMk id="2" creationId="{A3B10D37-35D8-44FB-8C77-B3901EE3A4D3}"/>
+          </ac:spMkLst>
+        </pc:spChg>
+        <pc:spChg chg="mod">
+          <ac:chgData name="Joshua Gross" userId="7bb6a70e-9d37-46e4-96de-748557707bd0" providerId="ADAL" clId="{C4CD2F8B-4DF7-4CBE-9333-F4F03BBCBE6E}" dt="2023-10-02T12:13:35.919" v="2599" actId="1076"/>
           <ac:spMkLst>
             <pc:docMk/>
             <pc:sldMk cId="1922963660" sldId="269"/>
@@ -689,8 +730,8 @@
             <ac:picMk id="5" creationId="{0BE2251C-899B-4125-BA01-392020058228}"/>
           </ac:picMkLst>
         </pc:picChg>
-        <pc:picChg chg="add mod">
-          <ac:chgData name="Joshua Gross" userId="7bb6a70e-9d37-46e4-96de-748557707bd0" providerId="ADAL" clId="{C4CD2F8B-4DF7-4CBE-9333-F4F03BBCBE6E}" dt="2023-09-26T13:12:39.684" v="2280" actId="1076"/>
+        <pc:picChg chg="add mod modCrop">
+          <ac:chgData name="Joshua Gross" userId="7bb6a70e-9d37-46e4-96de-748557707bd0" providerId="ADAL" clId="{C4CD2F8B-4DF7-4CBE-9333-F4F03BBCBE6E}" dt="2023-10-02T12:58:39.665" v="2625" actId="732"/>
           <ac:picMkLst>
             <pc:docMk/>
             <pc:sldMk cId="1922963660" sldId="269"/>
@@ -699,7 +740,7 @@
         </pc:picChg>
       </pc:sldChg>
       <pc:sldChg chg="addSp delSp modSp add">
-        <pc:chgData name="Joshua Gross" userId="7bb6a70e-9d37-46e4-96de-748557707bd0" providerId="ADAL" clId="{C4CD2F8B-4DF7-4CBE-9333-F4F03BBCBE6E}" dt="2023-09-26T13:15:45.714" v="2414" actId="1076"/>
+        <pc:chgData name="Joshua Gross" userId="7bb6a70e-9d37-46e4-96de-748557707bd0" providerId="ADAL" clId="{C4CD2F8B-4DF7-4CBE-9333-F4F03BBCBE6E}" dt="2023-10-02T12:57:29.824" v="2621" actId="1582"/>
         <pc:sldMkLst>
           <pc:docMk/>
           <pc:sldMk cId="3404208113" sldId="270"/>
@@ -729,11 +770,74 @@
           </ac:spMkLst>
         </pc:spChg>
         <pc:picChg chg="mod ord modCrop">
-          <ac:chgData name="Joshua Gross" userId="7bb6a70e-9d37-46e4-96de-748557707bd0" providerId="ADAL" clId="{C4CD2F8B-4DF7-4CBE-9333-F4F03BBCBE6E}" dt="2023-09-26T13:15:45.714" v="2414" actId="1076"/>
+          <ac:chgData name="Joshua Gross" userId="7bb6a70e-9d37-46e4-96de-748557707bd0" providerId="ADAL" clId="{C4CD2F8B-4DF7-4CBE-9333-F4F03BBCBE6E}" dt="2023-10-02T12:57:29.824" v="2621" actId="1582"/>
           <ac:picMkLst>
             <pc:docMk/>
             <pc:sldMk cId="3404208113" sldId="270"/>
             <ac:picMk id="5" creationId="{4AA45268-2785-45E6-A39F-206F504538E9}"/>
+          </ac:picMkLst>
+        </pc:picChg>
+      </pc:sldChg>
+      <pc:sldChg chg="addSp modSp add">
+        <pc:chgData name="Joshua Gross" userId="7bb6a70e-9d37-46e4-96de-748557707bd0" providerId="ADAL" clId="{C4CD2F8B-4DF7-4CBE-9333-F4F03BBCBE6E}" dt="2023-10-02T12:10:05.501" v="2536" actId="20577"/>
+        <pc:sldMkLst>
+          <pc:docMk/>
+          <pc:sldMk cId="1050613931" sldId="271"/>
+        </pc:sldMkLst>
+        <pc:spChg chg="mod">
+          <ac:chgData name="Joshua Gross" userId="7bb6a70e-9d37-46e4-96de-748557707bd0" providerId="ADAL" clId="{C4CD2F8B-4DF7-4CBE-9333-F4F03BBCBE6E}" dt="2023-10-02T12:08:38.974" v="2419" actId="1076"/>
+          <ac:spMkLst>
+            <pc:docMk/>
+            <pc:sldMk cId="1050613931" sldId="271"/>
+            <ac:spMk id="7" creationId="{59E0DB39-A418-437C-BFC5-BB9D5B858D98}"/>
+          </ac:spMkLst>
+        </pc:spChg>
+        <pc:spChg chg="mod">
+          <ac:chgData name="Joshua Gross" userId="7bb6a70e-9d37-46e4-96de-748557707bd0" providerId="ADAL" clId="{C4CD2F8B-4DF7-4CBE-9333-F4F03BBCBE6E}" dt="2023-10-02T12:08:42.631" v="2420" actId="1076"/>
+          <ac:spMkLst>
+            <pc:docMk/>
+            <pc:sldMk cId="1050613931" sldId="271"/>
+            <ac:spMk id="8" creationId="{77E41D42-49F2-426D-A97F-5CE6A6A4D58F}"/>
+          </ac:spMkLst>
+        </pc:spChg>
+        <pc:spChg chg="mod">
+          <ac:chgData name="Joshua Gross" userId="7bb6a70e-9d37-46e4-96de-748557707bd0" providerId="ADAL" clId="{C4CD2F8B-4DF7-4CBE-9333-F4F03BBCBE6E}" dt="2023-10-02T12:08:51.587" v="2423" actId="1076"/>
+          <ac:spMkLst>
+            <pc:docMk/>
+            <pc:sldMk cId="1050613931" sldId="271"/>
+            <ac:spMk id="9" creationId="{59C2130F-35B1-4EB6-9207-69E52E9D5CC0}"/>
+          </ac:spMkLst>
+        </pc:spChg>
+        <pc:spChg chg="add mod">
+          <ac:chgData name="Joshua Gross" userId="7bb6a70e-9d37-46e4-96de-748557707bd0" providerId="ADAL" clId="{C4CD2F8B-4DF7-4CBE-9333-F4F03BBCBE6E}" dt="2023-10-02T12:10:05.501" v="2536" actId="20577"/>
+          <ac:spMkLst>
+            <pc:docMk/>
+            <pc:sldMk cId="1050613931" sldId="271"/>
+            <ac:spMk id="10" creationId="{8943C5B7-88BB-4C89-9F2B-81CA24EDF7D8}"/>
+          </ac:spMkLst>
+        </pc:spChg>
+        <pc:picChg chg="mod">
+          <ac:chgData name="Joshua Gross" userId="7bb6a70e-9d37-46e4-96de-748557707bd0" providerId="ADAL" clId="{C4CD2F8B-4DF7-4CBE-9333-F4F03BBCBE6E}" dt="2023-10-02T12:08:38.974" v="2419" actId="1076"/>
+          <ac:picMkLst>
+            <pc:docMk/>
+            <pc:sldMk cId="1050613931" sldId="271"/>
+            <ac:picMk id="4" creationId="{E23F4A1F-72C7-4ADF-B7C1-B1F374F8A8BB}"/>
+          </ac:picMkLst>
+        </pc:picChg>
+        <pc:picChg chg="mod">
+          <ac:chgData name="Joshua Gross" userId="7bb6a70e-9d37-46e4-96de-748557707bd0" providerId="ADAL" clId="{C4CD2F8B-4DF7-4CBE-9333-F4F03BBCBE6E}" dt="2023-10-02T12:08:51.587" v="2423" actId="1076"/>
+          <ac:picMkLst>
+            <pc:docMk/>
+            <pc:sldMk cId="1050613931" sldId="271"/>
+            <ac:picMk id="5" creationId="{64A3D6A5-7A12-4907-8A83-EEB248A4CB46}"/>
+          </ac:picMkLst>
+        </pc:picChg>
+        <pc:picChg chg="mod">
+          <ac:chgData name="Joshua Gross" userId="7bb6a70e-9d37-46e4-96de-748557707bd0" providerId="ADAL" clId="{C4CD2F8B-4DF7-4CBE-9333-F4F03BBCBE6E}" dt="2023-10-02T12:08:42.631" v="2420" actId="1076"/>
+          <ac:picMkLst>
+            <pc:docMk/>
+            <pc:sldMk cId="1050613931" sldId="271"/>
+            <ac:picMk id="6" creationId="{4C46BCB9-71FD-48E7-AD17-51EAF28F61CA}"/>
           </ac:picMkLst>
         </pc:picChg>
       </pc:sldChg>
@@ -889,7 +993,7 @@
           <a:p>
             <a:fld id="{2F6E4A9B-47C0-4409-BD2D-9AC734860245}" type="datetimeFigureOut">
               <a:rPr lang="en-US" smtClean="0"/>
-              <a:t>9/26/2023</a:t>
+              <a:t>10/2/2023</a:t>
             </a:fld>
             <a:endParaRPr lang="en-US"/>
           </a:p>
@@ -1087,7 +1191,7 @@
           <a:p>
             <a:fld id="{2F6E4A9B-47C0-4409-BD2D-9AC734860245}" type="datetimeFigureOut">
               <a:rPr lang="en-US" smtClean="0"/>
-              <a:t>9/26/2023</a:t>
+              <a:t>10/2/2023</a:t>
             </a:fld>
             <a:endParaRPr lang="en-US"/>
           </a:p>
@@ -1295,7 +1399,7 @@
           <a:p>
             <a:fld id="{2F6E4A9B-47C0-4409-BD2D-9AC734860245}" type="datetimeFigureOut">
               <a:rPr lang="en-US" smtClean="0"/>
-              <a:t>9/26/2023</a:t>
+              <a:t>10/2/2023</a:t>
             </a:fld>
             <a:endParaRPr lang="en-US"/>
           </a:p>
@@ -1493,7 +1597,7 @@
           <a:p>
             <a:fld id="{2F6E4A9B-47C0-4409-BD2D-9AC734860245}" type="datetimeFigureOut">
               <a:rPr lang="en-US" smtClean="0"/>
-              <a:t>9/26/2023</a:t>
+              <a:t>10/2/2023</a:t>
             </a:fld>
             <a:endParaRPr lang="en-US"/>
           </a:p>
@@ -1768,7 +1872,7 @@
           <a:p>
             <a:fld id="{2F6E4A9B-47C0-4409-BD2D-9AC734860245}" type="datetimeFigureOut">
               <a:rPr lang="en-US" smtClean="0"/>
-              <a:t>9/26/2023</a:t>
+              <a:t>10/2/2023</a:t>
             </a:fld>
             <a:endParaRPr lang="en-US"/>
           </a:p>
@@ -2033,7 +2137,7 @@
           <a:p>
             <a:fld id="{2F6E4A9B-47C0-4409-BD2D-9AC734860245}" type="datetimeFigureOut">
               <a:rPr lang="en-US" smtClean="0"/>
-              <a:t>9/26/2023</a:t>
+              <a:t>10/2/2023</a:t>
             </a:fld>
             <a:endParaRPr lang="en-US"/>
           </a:p>
@@ -2445,7 +2549,7 @@
           <a:p>
             <a:fld id="{2F6E4A9B-47C0-4409-BD2D-9AC734860245}" type="datetimeFigureOut">
               <a:rPr lang="en-US" smtClean="0"/>
-              <a:t>9/26/2023</a:t>
+              <a:t>10/2/2023</a:t>
             </a:fld>
             <a:endParaRPr lang="en-US"/>
           </a:p>
@@ -2586,7 +2690,7 @@
           <a:p>
             <a:fld id="{2F6E4A9B-47C0-4409-BD2D-9AC734860245}" type="datetimeFigureOut">
               <a:rPr lang="en-US" smtClean="0"/>
-              <a:t>9/26/2023</a:t>
+              <a:t>10/2/2023</a:t>
             </a:fld>
             <a:endParaRPr lang="en-US"/>
           </a:p>
@@ -2699,7 +2803,7 @@
           <a:p>
             <a:fld id="{2F6E4A9B-47C0-4409-BD2D-9AC734860245}" type="datetimeFigureOut">
               <a:rPr lang="en-US" smtClean="0"/>
-              <a:t>9/26/2023</a:t>
+              <a:t>10/2/2023</a:t>
             </a:fld>
             <a:endParaRPr lang="en-US"/>
           </a:p>
@@ -3010,7 +3114,7 @@
           <a:p>
             <a:fld id="{2F6E4A9B-47C0-4409-BD2D-9AC734860245}" type="datetimeFigureOut">
               <a:rPr lang="en-US" smtClean="0"/>
-              <a:t>9/26/2023</a:t>
+              <a:t>10/2/2023</a:t>
             </a:fld>
             <a:endParaRPr lang="en-US"/>
           </a:p>
@@ -3298,7 +3402,7 @@
           <a:p>
             <a:fld id="{2F6E4A9B-47C0-4409-BD2D-9AC734860245}" type="datetimeFigureOut">
               <a:rPr lang="en-US" smtClean="0"/>
-              <a:t>9/26/2023</a:t>
+              <a:t>10/2/2023</a:t>
             </a:fld>
             <a:endParaRPr lang="en-US"/>
           </a:p>
@@ -3539,7 +3643,7 @@
           <a:p>
             <a:fld id="{2F6E4A9B-47C0-4409-BD2D-9AC734860245}" type="datetimeFigureOut">
               <a:rPr lang="en-US" smtClean="0"/>
-              <a:t>9/26/2023</a:t>
+              <a:t>10/2/2023</a:t>
             </a:fld>
             <a:endParaRPr lang="en-US"/>
           </a:p>
@@ -4062,7 +4166,7 @@
           <a:p>
             <a:r>
               <a:rPr lang="en-US" dirty="0"/>
-              <a:t>Day 5: Create the “New” and “Sale” Pages</a:t>
+              <a:t>Day 4: Create the “New” and “Sale” Pages</a:t>
             </a:r>
           </a:p>
         </p:txBody>
@@ -4081,56 +4185,118 @@
           </p:cNvPicPr>
           <p:nvPr/>
         </p:nvPicPr>
-        <p:blipFill>
+        <p:blipFill rotWithShape="1">
           <a:blip r:embed="rId2"/>
-          <a:stretch>
-            <a:fillRect/>
-          </a:stretch>
+          <a:srcRect t="25976"/>
+          <a:stretch/>
         </p:blipFill>
         <p:spPr>
           <a:xfrm>
-            <a:off x="900418" y="1467693"/>
-            <a:ext cx="10391164" cy="2462930"/>
+            <a:off x="719443" y="2021746"/>
+            <a:ext cx="10391164" cy="1823151"/>
           </a:xfrm>
           <a:prstGeom prst="rect">
             <a:avLst/>
           </a:prstGeom>
         </p:spPr>
       </p:pic>
-      <p:pic>
-        <p:nvPicPr>
-          <p:cNvPr id="6" name="Picture 5">
-            <a:extLst>
-              <a:ext uri="{FF2B5EF4-FFF2-40B4-BE49-F238E27FC236}">
-                <a16:creationId xmlns:a16="http://schemas.microsoft.com/office/drawing/2014/main" id="{49B34222-9073-4EFC-93E1-490D8AE958A1}"/>
-              </a:ext>
-            </a:extLst>
-          </p:cNvPr>
-          <p:cNvPicPr>
-            <a:picLocks noChangeAspect="1"/>
-          </p:cNvPicPr>
+      <p:sp>
+        <p:nvSpPr>
+          <p:cNvPr id="6" name="TextBox 5">
+            <a:extLst>
+              <a:ext uri="{FF2B5EF4-FFF2-40B4-BE49-F238E27FC236}">
+                <a16:creationId xmlns:a16="http://schemas.microsoft.com/office/drawing/2014/main" id="{58FE0D21-5F4E-41D5-918E-98113CFDED0B}"/>
+              </a:ext>
+            </a:extLst>
+          </p:cNvPr>
+          <p:cNvSpPr txBox="1"/>
           <p:nvPr/>
-        </p:nvPicPr>
-        <p:blipFill>
-          <a:blip r:embed="rId3"/>
-          <a:stretch>
-            <a:fillRect/>
-          </a:stretch>
-        </p:blipFill>
+        </p:nvSpPr>
         <p:spPr>
           <a:xfrm>
-            <a:off x="900418" y="4016732"/>
-            <a:ext cx="10391164" cy="2582806"/>
+            <a:off x="3319767" y="3994328"/>
+            <a:ext cx="5253781" cy="2800767"/>
           </a:xfrm>
           <a:prstGeom prst="rect">
             <a:avLst/>
           </a:prstGeom>
+          <a:noFill/>
+          <a:ln w="38100">
+            <a:solidFill>
+              <a:schemeClr val="tx1"/>
+            </a:solidFill>
+          </a:ln>
         </p:spPr>
-      </p:pic>
+        <p:txBody>
+          <a:bodyPr wrap="square" rtlCol="0">
+            <a:spAutoFit/>
+          </a:bodyPr>
+          <a:lstStyle/>
+          <a:p>
+            <a:r>
+              <a:rPr lang="en-US" sz="3200" b="1" dirty="0"/>
+              <a:t>HTML (new.html)</a:t>
+            </a:r>
+            <a:endParaRPr lang="en-US" sz="2400" b="1" dirty="0"/>
+          </a:p>
+          <a:p>
+            <a:r>
+              <a:rPr lang="en-US" sz="2400" dirty="0"/>
+              <a:t>&lt;link </a:t>
+            </a:r>
+            <a:r>
+              <a:rPr lang="en-US" sz="2400" dirty="0" err="1"/>
+              <a:t>rel</a:t>
+            </a:r>
+            <a:r>
+              <a:rPr lang="en-US" sz="2400" dirty="0"/>
+              <a:t>="stylesheet" </a:t>
+            </a:r>
+            <a:r>
+              <a:rPr lang="en-US" sz="2400" dirty="0" err="1"/>
+              <a:t>href</a:t>
+            </a:r>
+            <a:r>
+              <a:rPr lang="en-US" sz="2400" dirty="0"/>
+              <a:t>="styles.css"&gt;</a:t>
+            </a:r>
+          </a:p>
+          <a:p>
+            <a:r>
+              <a:rPr lang="en-US" sz="2400" dirty="0"/>
+              <a:t>&lt;div id="store"&gt;</a:t>
+            </a:r>
+          </a:p>
+          <a:p>
+            <a:r>
+              <a:rPr lang="en-US" sz="2400" dirty="0"/>
+              <a:t>    &lt;!-- orange hat item container --&gt;</a:t>
+            </a:r>
+          </a:p>
+          <a:p>
+            <a:r>
+              <a:rPr lang="en-US" sz="2400" dirty="0"/>
+              <a:t>    &lt;!-- orange pillow item container --&gt;</a:t>
+            </a:r>
+          </a:p>
+          <a:p>
+            <a:r>
+              <a:rPr lang="en-US" sz="2400" dirty="0"/>
+              <a:t>    &lt;!-- orange pants item container --&gt;</a:t>
+            </a:r>
+          </a:p>
+          <a:p>
+            <a:r>
+              <a:rPr lang="en-US" sz="2400" dirty="0"/>
+              <a:t>&lt;/div&gt;</a:t>
+            </a:r>
+          </a:p>
+        </p:txBody>
+      </p:sp>
     </p:spTree>
     <p:extLst>
       <p:ext uri="{BB962C8B-B14F-4D97-AF65-F5344CB8AC3E}">
-        <p14:creationId xmlns:p14="http://schemas.microsoft.com/office/powerpoint/2010/main" val="1597390541"/>
+        <p14:creationId xmlns:p14="http://schemas.microsoft.com/office/powerpoint/2010/main" val="263100609"/>
       </p:ext>
     </p:extLst>
   </p:cSld>
@@ -4180,57 +4346,27 @@
           <a:p>
             <a:r>
               <a:rPr lang="en-US" dirty="0"/>
-              <a:t>Day 5: Create the “New” and “Sale” Pages</a:t>
-            </a:r>
-          </a:p>
-        </p:txBody>
-      </p:sp>
-      <p:pic>
-        <p:nvPicPr>
-          <p:cNvPr id="5" name="Picture 4">
-            <a:extLst>
-              <a:ext uri="{FF2B5EF4-FFF2-40B4-BE49-F238E27FC236}">
-                <a16:creationId xmlns:a16="http://schemas.microsoft.com/office/drawing/2014/main" id="{0BE2251C-899B-4125-BA01-392020058228}"/>
-              </a:ext>
-            </a:extLst>
-          </p:cNvPr>
-          <p:cNvPicPr>
-            <a:picLocks noChangeAspect="1"/>
-          </p:cNvPicPr>
+              <a:t>Day 4: Create the “New” and “Sale” Pages</a:t>
+            </a:r>
+          </a:p>
+        </p:txBody>
+      </p:sp>
+      <p:sp>
+        <p:nvSpPr>
+          <p:cNvPr id="7" name="TextBox 6">
+            <a:extLst>
+              <a:ext uri="{FF2B5EF4-FFF2-40B4-BE49-F238E27FC236}">
+                <a16:creationId xmlns:a16="http://schemas.microsoft.com/office/drawing/2014/main" id="{F76B2B67-6105-45C4-B62F-1B4566376CF0}"/>
+              </a:ext>
+            </a:extLst>
+          </p:cNvPr>
+          <p:cNvSpPr txBox="1"/>
           <p:nvPr/>
-        </p:nvPicPr>
-        <p:blipFill>
-          <a:blip r:embed="rId2"/>
-          <a:stretch>
-            <a:fillRect/>
-          </a:stretch>
-        </p:blipFill>
+        </p:nvSpPr>
         <p:spPr>
           <a:xfrm>
-            <a:off x="719443" y="1381968"/>
-            <a:ext cx="10391164" cy="2462930"/>
-          </a:xfrm>
-          <a:prstGeom prst="rect">
-            <a:avLst/>
-          </a:prstGeom>
-        </p:spPr>
-      </p:pic>
-      <p:sp>
-        <p:nvSpPr>
-          <p:cNvPr id="7" name="TextBox 6">
-            <a:extLst>
-              <a:ext uri="{FF2B5EF4-FFF2-40B4-BE49-F238E27FC236}">
-                <a16:creationId xmlns:a16="http://schemas.microsoft.com/office/drawing/2014/main" id="{F76B2B67-6105-45C4-B62F-1B4566376CF0}"/>
-              </a:ext>
-            </a:extLst>
-          </p:cNvPr>
-          <p:cNvSpPr txBox="1"/>
-          <p:nvPr/>
-        </p:nvSpPr>
-        <p:spPr>
-          <a:xfrm>
-            <a:off x="3319768" y="4061440"/>
-            <a:ext cx="4962490" cy="2431435"/>
+            <a:off x="3319767" y="3994328"/>
+            <a:ext cx="5253781" cy="2800767"/>
           </a:xfrm>
           <a:prstGeom prst="rect">
             <a:avLst/>
@@ -4250,9 +4386,31 @@
           <a:p>
             <a:r>
               <a:rPr lang="en-US" sz="3200" b="1" dirty="0"/>
-              <a:t>HTML (new.html)</a:t>
+              <a:t>HTML (sale.html)</a:t>
             </a:r>
             <a:endParaRPr lang="en-US" sz="2400" b="1" dirty="0"/>
+          </a:p>
+          <a:p>
+            <a:r>
+              <a:rPr lang="en-US" sz="2400" dirty="0"/>
+              <a:t>&lt;link </a:t>
+            </a:r>
+            <a:r>
+              <a:rPr lang="en-US" sz="2400" dirty="0" err="1"/>
+              <a:t>rel</a:t>
+            </a:r>
+            <a:r>
+              <a:rPr lang="en-US" sz="2400" dirty="0"/>
+              <a:t>="stylesheet" </a:t>
+            </a:r>
+            <a:r>
+              <a:rPr lang="en-US" sz="2400" dirty="0" err="1"/>
+              <a:t>href</a:t>
+            </a:r>
+            <a:r>
+              <a:rPr lang="en-US" sz="2400" dirty="0"/>
+              <a:t>="styles.css"&gt;</a:t>
+            </a:r>
           </a:p>
           <a:p>
             <a:r>
@@ -4263,19 +4421,19 @@
           <a:p>
             <a:r>
               <a:rPr lang="en-US" sz="2400" dirty="0"/>
-              <a:t>    &lt;!-- blue hat item container --&gt;</a:t>
+              <a:t>    &lt;!-- orange hat item container --&gt;</a:t>
             </a:r>
           </a:p>
           <a:p>
             <a:r>
               <a:rPr lang="en-US" sz="2400" dirty="0"/>
-              <a:t>    &lt;!-- blue pillow item container --&gt;</a:t>
+              <a:t>    &lt;!-- orange pillow item container --&gt;</a:t>
             </a:r>
           </a:p>
           <a:p>
             <a:r>
               <a:rPr lang="en-US" sz="2400" dirty="0"/>
-              <a:t>    &lt;!-- blue pants item container --&gt;</a:t>
+              <a:t>    &lt;!-- orange pants item container --&gt;</a:t>
             </a:r>
           </a:p>
           <a:p>
@@ -4286,10 +4444,39 @@
           </a:p>
         </p:txBody>
       </p:sp>
+      <p:pic>
+        <p:nvPicPr>
+          <p:cNvPr id="6" name="Picture 5">
+            <a:extLst>
+              <a:ext uri="{FF2B5EF4-FFF2-40B4-BE49-F238E27FC236}">
+                <a16:creationId xmlns:a16="http://schemas.microsoft.com/office/drawing/2014/main" id="{5CCE1306-047B-4405-8DA7-3DD29A208E36}"/>
+              </a:ext>
+            </a:extLst>
+          </p:cNvPr>
+          <p:cNvPicPr>
+            <a:picLocks noChangeAspect="1"/>
+          </p:cNvPicPr>
+          <p:nvPr/>
+        </p:nvPicPr>
+        <p:blipFill rotWithShape="1">
+          <a:blip r:embed="rId2"/>
+          <a:srcRect t="24395"/>
+          <a:stretch/>
+        </p:blipFill>
+        <p:spPr>
+          <a:xfrm>
+            <a:off x="900418" y="1979802"/>
+            <a:ext cx="10391164" cy="1952736"/>
+          </a:xfrm>
+          <a:prstGeom prst="rect">
+            <a:avLst/>
+          </a:prstGeom>
+        </p:spPr>
+      </p:pic>
     </p:spTree>
     <p:extLst>
       <p:ext uri="{BB962C8B-B14F-4D97-AF65-F5344CB8AC3E}">
-        <p14:creationId xmlns:p14="http://schemas.microsoft.com/office/powerpoint/2010/main" val="263100609"/>
+        <p14:creationId xmlns:p14="http://schemas.microsoft.com/office/powerpoint/2010/main" val="1922963660"/>
       </p:ext>
     </p:extLst>
   </p:cSld>
@@ -4339,17 +4526,46 @@
           <a:p>
             <a:r>
               <a:rPr lang="en-US" dirty="0"/>
-              <a:t>Day 5: Create the “New” and “Sale” Pages</a:t>
-            </a:r>
-          </a:p>
-        </p:txBody>
-      </p:sp>
-      <p:sp>
-        <p:nvSpPr>
-          <p:cNvPr id="7" name="TextBox 6">
-            <a:extLst>
-              <a:ext uri="{FF2B5EF4-FFF2-40B4-BE49-F238E27FC236}">
-                <a16:creationId xmlns:a16="http://schemas.microsoft.com/office/drawing/2014/main" id="{F76B2B67-6105-45C4-B62F-1B4566376CF0}"/>
+              <a:t>Day 5: Create the Header</a:t>
+            </a:r>
+          </a:p>
+        </p:txBody>
+      </p:sp>
+      <p:pic>
+        <p:nvPicPr>
+          <p:cNvPr id="4" name="Picture 3">
+            <a:extLst>
+              <a:ext uri="{FF2B5EF4-FFF2-40B4-BE49-F238E27FC236}">
+                <a16:creationId xmlns:a16="http://schemas.microsoft.com/office/drawing/2014/main" id="{E23F4A1F-72C7-4ADF-B7C1-B1F374F8A8BB}"/>
+              </a:ext>
+            </a:extLst>
+          </p:cNvPr>
+          <p:cNvPicPr>
+            <a:picLocks noChangeAspect="1"/>
+          </p:cNvPicPr>
+          <p:nvPr/>
+        </p:nvPicPr>
+        <p:blipFill rotWithShape="1">
+          <a:blip r:embed="rId2"/>
+          <a:srcRect b="85317"/>
+          <a:stretch/>
+        </p:blipFill>
+        <p:spPr>
+          <a:xfrm>
+            <a:off x="741028" y="1690688"/>
+            <a:ext cx="10709944" cy="725341"/>
+          </a:xfrm>
+          <a:prstGeom prst="rect">
+            <a:avLst/>
+          </a:prstGeom>
+        </p:spPr>
+      </p:pic>
+      <p:sp>
+        <p:nvSpPr>
+          <p:cNvPr id="5" name="TextBox 4">
+            <a:extLst>
+              <a:ext uri="{FF2B5EF4-FFF2-40B4-BE49-F238E27FC236}">
+                <a16:creationId xmlns:a16="http://schemas.microsoft.com/office/drawing/2014/main" id="{9E77DCF6-B70A-4118-BC45-9CC18EFA815C}"/>
               </a:ext>
             </a:extLst>
           </p:cNvPr>
@@ -4358,8 +4574,135 @@
         </p:nvSpPr>
         <p:spPr>
           <a:xfrm>
-            <a:off x="3319768" y="4061440"/>
-            <a:ext cx="4962490" cy="2431435"/>
+            <a:off x="741028" y="2776756"/>
+            <a:ext cx="5849358" cy="369332"/>
+          </a:xfrm>
+          <a:prstGeom prst="rect">
+            <a:avLst/>
+          </a:prstGeom>
+          <a:noFill/>
+        </p:spPr>
+        <p:txBody>
+          <a:bodyPr wrap="none" rtlCol="0">
+            <a:spAutoFit/>
+          </a:bodyPr>
+          <a:lstStyle/>
+          <a:p>
+            <a:r>
+              <a:rPr lang="en-US" dirty="0"/>
+              <a:t>A tab for each page that navigates to that page upon clicking</a:t>
+            </a:r>
+          </a:p>
+        </p:txBody>
+      </p:sp>
+    </p:spTree>
+    <p:extLst>
+      <p:ext uri="{BB962C8B-B14F-4D97-AF65-F5344CB8AC3E}">
+        <p14:creationId xmlns:p14="http://schemas.microsoft.com/office/powerpoint/2010/main" val="1152250863"/>
+      </p:ext>
+    </p:extLst>
+  </p:cSld>
+  <p:clrMapOvr>
+    <a:masterClrMapping/>
+  </p:clrMapOvr>
+</p:sld>
+</file>
+
+<file path=ppt/slides/slide13.xml><?xml version="1.0" encoding="utf-8"?>
+<p:sld xmlns:a="http://schemas.openxmlformats.org/drawingml/2006/main" xmlns:r="http://schemas.openxmlformats.org/officeDocument/2006/relationships" xmlns:p="http://schemas.openxmlformats.org/presentationml/2006/main">
+  <p:cSld>
+    <p:spTree>
+      <p:nvGrpSpPr>
+        <p:cNvPr id="1" name=""/>
+        <p:cNvGrpSpPr/>
+        <p:nvPr/>
+      </p:nvGrpSpPr>
+      <p:grpSpPr>
+        <a:xfrm>
+          <a:off x="0" y="0"/>
+          <a:ext cx="0" cy="0"/>
+          <a:chOff x="0" y="0"/>
+          <a:chExt cx="0" cy="0"/>
+        </a:xfrm>
+      </p:grpSpPr>
+      <p:sp>
+        <p:nvSpPr>
+          <p:cNvPr id="2" name="Title 1">
+            <a:extLst>
+              <a:ext uri="{FF2B5EF4-FFF2-40B4-BE49-F238E27FC236}">
+                <a16:creationId xmlns:a16="http://schemas.microsoft.com/office/drawing/2014/main" id="{A3B10D37-35D8-44FB-8C77-B3901EE3A4D3}"/>
+              </a:ext>
+            </a:extLst>
+          </p:cNvPr>
+          <p:cNvSpPr>
+            <a:spLocks noGrp="1"/>
+          </p:cNvSpPr>
+          <p:nvPr>
+            <p:ph type="title"/>
+          </p:nvPr>
+        </p:nvSpPr>
+        <p:spPr>
+          <a:xfrm>
+            <a:off x="131428" y="79375"/>
+            <a:ext cx="10515600" cy="1325563"/>
+          </a:xfrm>
+        </p:spPr>
+        <p:txBody>
+          <a:bodyPr/>
+          <a:lstStyle/>
+          <a:p>
+            <a:r>
+              <a:rPr lang="en-US" dirty="0"/>
+              <a:t>Day 5: Create the Header</a:t>
+            </a:r>
+          </a:p>
+        </p:txBody>
+      </p:sp>
+      <p:pic>
+        <p:nvPicPr>
+          <p:cNvPr id="4" name="Picture 3">
+            <a:extLst>
+              <a:ext uri="{FF2B5EF4-FFF2-40B4-BE49-F238E27FC236}">
+                <a16:creationId xmlns:a16="http://schemas.microsoft.com/office/drawing/2014/main" id="{E23F4A1F-72C7-4ADF-B7C1-B1F374F8A8BB}"/>
+              </a:ext>
+            </a:extLst>
+          </p:cNvPr>
+          <p:cNvPicPr>
+            <a:picLocks noChangeAspect="1"/>
+          </p:cNvPicPr>
+          <p:nvPr/>
+        </p:nvPicPr>
+        <p:blipFill rotWithShape="1">
+          <a:blip r:embed="rId2"/>
+          <a:srcRect r="47955" b="85317"/>
+          <a:stretch/>
+        </p:blipFill>
+        <p:spPr>
+          <a:xfrm>
+            <a:off x="131428" y="1042267"/>
+            <a:ext cx="5574047" cy="725341"/>
+          </a:xfrm>
+          <a:prstGeom prst="rect">
+            <a:avLst/>
+          </a:prstGeom>
+        </p:spPr>
+      </p:pic>
+      <p:sp>
+        <p:nvSpPr>
+          <p:cNvPr id="6" name="TextBox 5">
+            <a:extLst>
+              <a:ext uri="{FF2B5EF4-FFF2-40B4-BE49-F238E27FC236}">
+                <a16:creationId xmlns:a16="http://schemas.microsoft.com/office/drawing/2014/main" id="{86EF8CE6-4AD3-4B21-B676-767587239E6D}"/>
+              </a:ext>
+            </a:extLst>
+          </p:cNvPr>
+          <p:cNvSpPr txBox="1"/>
+          <p:nvPr/>
+        </p:nvSpPr>
+        <p:spPr>
+          <a:xfrm>
+            <a:off x="699061" y="1811185"/>
+            <a:ext cx="3855479" cy="4955203"/>
           </a:xfrm>
           <a:prstGeom prst="rect">
             <a:avLst/>
@@ -4372,83 +4715,432 @@
           </a:ln>
         </p:spPr>
         <p:txBody>
-          <a:bodyPr wrap="square" rtlCol="0">
+          <a:bodyPr wrap="none" rtlCol="0">
             <a:spAutoFit/>
           </a:bodyPr>
           <a:lstStyle/>
           <a:p>
             <a:r>
-              <a:rPr lang="en-US" sz="3200" b="1" dirty="0"/>
-              <a:t>HTML (sale.html)</a:t>
-            </a:r>
-            <a:endParaRPr lang="en-US" sz="2400" b="1" dirty="0"/>
-          </a:p>
-          <a:p>
-            <a:r>
-              <a:rPr lang="en-US" sz="2400" dirty="0"/>
-              <a:t>&lt;div id="store"&gt;</a:t>
-            </a:r>
-          </a:p>
-          <a:p>
-            <a:r>
-              <a:rPr lang="en-US" sz="2400" dirty="0"/>
-              <a:t>    &lt;!-- orange hat item container --&gt;</a:t>
-            </a:r>
-          </a:p>
-          <a:p>
-            <a:r>
-              <a:rPr lang="en-US" sz="2400" dirty="0"/>
-              <a:t>    &lt;!-- orange pillow item container --&gt;</a:t>
-            </a:r>
-          </a:p>
-          <a:p>
-            <a:r>
-              <a:rPr lang="en-US" sz="2400" dirty="0"/>
-              <a:t>    &lt;!-- orange pants item container --&gt;</a:t>
-            </a:r>
-          </a:p>
-          <a:p>
-            <a:r>
-              <a:rPr lang="en-US" sz="2400" dirty="0"/>
-              <a:t>&lt;/div&gt;</a:t>
-            </a:r>
-          </a:p>
-        </p:txBody>
-      </p:sp>
-      <p:pic>
-        <p:nvPicPr>
-          <p:cNvPr id="6" name="Picture 5">
-            <a:extLst>
-              <a:ext uri="{FF2B5EF4-FFF2-40B4-BE49-F238E27FC236}">
-                <a16:creationId xmlns:a16="http://schemas.microsoft.com/office/drawing/2014/main" id="{5CCE1306-047B-4405-8DA7-3DD29A208E36}"/>
-              </a:ext>
-            </a:extLst>
-          </p:cNvPr>
-          <p:cNvPicPr>
-            <a:picLocks noChangeAspect="1"/>
-          </p:cNvPicPr>
+              <a:rPr lang="en-US" sz="2800" b="1" dirty="0"/>
+              <a:t>HTML (every html file)</a:t>
+            </a:r>
+            <a:endParaRPr lang="en-US" sz="1600" b="1" dirty="0"/>
+          </a:p>
+          <a:p>
+            <a:r>
+              <a:rPr lang="en-US" sz="1600" dirty="0"/>
+              <a:t>&lt;header&gt;</a:t>
+            </a:r>
+          </a:p>
+          <a:p>
+            <a:r>
+              <a:rPr lang="en-US" sz="1600" dirty="0"/>
+              <a:t>        &lt;link </a:t>
+            </a:r>
+            <a:r>
+              <a:rPr lang="en-US" sz="1600" dirty="0" err="1"/>
+              <a:t>rel</a:t>
+            </a:r>
+            <a:r>
+              <a:rPr lang="en-US" sz="1600" dirty="0"/>
+              <a:t>="stylesheet" </a:t>
+            </a:r>
+            <a:r>
+              <a:rPr lang="en-US" sz="1600" dirty="0" err="1"/>
+              <a:t>href</a:t>
+            </a:r>
+            <a:r>
+              <a:rPr lang="en-US" sz="1600" dirty="0"/>
+              <a:t>="styles.css"&gt;</a:t>
+            </a:r>
+          </a:p>
+          <a:p>
+            <a:r>
+              <a:rPr lang="en-US" sz="1600" dirty="0"/>
+              <a:t>        &lt;ul&gt;</a:t>
+            </a:r>
+          </a:p>
+          <a:p>
+            <a:r>
+              <a:rPr lang="en-US" sz="1600" dirty="0"/>
+              <a:t>            &lt;span&gt; Bearcat School Store &lt;/span&gt;</a:t>
+            </a:r>
+          </a:p>
+          <a:p>
+            <a:r>
+              <a:rPr lang="en-US" sz="1600" dirty="0"/>
+              <a:t>            &lt;a </a:t>
+            </a:r>
+            <a:r>
+              <a:rPr lang="en-US" sz="1600" dirty="0" err="1"/>
+              <a:t>href</a:t>
+            </a:r>
+            <a:r>
+              <a:rPr lang="en-US" sz="1600" dirty="0"/>
+              <a:t>="index.html"&gt;</a:t>
+            </a:r>
+          </a:p>
+          <a:p>
+            <a:r>
+              <a:rPr lang="en-US" sz="1600" dirty="0"/>
+              <a:t>           &lt;li&gt;Home&lt;/li&gt;</a:t>
+            </a:r>
+          </a:p>
+          <a:p>
+            <a:r>
+              <a:rPr lang="en-US" sz="1600" dirty="0"/>
+              <a:t>            &lt;/a&gt;</a:t>
+            </a:r>
+          </a:p>
+          <a:p>
+            <a:r>
+              <a:rPr lang="en-US" sz="1600" dirty="0"/>
+              <a:t>            &lt;a </a:t>
+            </a:r>
+            <a:r>
+              <a:rPr lang="en-US" sz="1600" dirty="0" err="1"/>
+              <a:t>href</a:t>
+            </a:r>
+            <a:r>
+              <a:rPr lang="en-US" sz="1600" dirty="0"/>
+              <a:t>="new.html"&gt;</a:t>
+            </a:r>
+          </a:p>
+          <a:p>
+            <a:r>
+              <a:rPr lang="en-US" sz="1600" dirty="0"/>
+              <a:t>                &lt;li&gt;New&lt;/li&gt;</a:t>
+            </a:r>
+          </a:p>
+          <a:p>
+            <a:r>
+              <a:rPr lang="en-US" sz="1600" dirty="0"/>
+              <a:t>            &lt;/a&gt;</a:t>
+            </a:r>
+          </a:p>
+          <a:p>
+            <a:r>
+              <a:rPr lang="en-US" sz="1600" dirty="0"/>
+              <a:t>            &lt;a </a:t>
+            </a:r>
+            <a:r>
+              <a:rPr lang="en-US" sz="1600" dirty="0" err="1"/>
+              <a:t>href</a:t>
+            </a:r>
+            <a:r>
+              <a:rPr lang="en-US" sz="1600" dirty="0"/>
+              <a:t>="sale.html"&gt;</a:t>
+            </a:r>
+          </a:p>
+          <a:p>
+            <a:r>
+              <a:rPr lang="en-US" sz="1600" dirty="0"/>
+              <a:t>                &lt;li&gt;On Sale&lt;/li&gt;</a:t>
+            </a:r>
+          </a:p>
+          <a:p>
+            <a:r>
+              <a:rPr lang="en-US" sz="1600" dirty="0"/>
+              <a:t>            &lt;/a&gt;</a:t>
+            </a:r>
+          </a:p>
+          <a:p>
+            <a:r>
+              <a:rPr lang="en-US" sz="1600" dirty="0"/>
+              <a:t>            &lt;a </a:t>
+            </a:r>
+            <a:r>
+              <a:rPr lang="en-US" sz="1600" dirty="0" err="1"/>
+              <a:t>href</a:t>
+            </a:r>
+            <a:r>
+              <a:rPr lang="en-US" sz="1600" dirty="0"/>
+              <a:t>="contact.html"&gt;</a:t>
+            </a:r>
+          </a:p>
+          <a:p>
+            <a:r>
+              <a:rPr lang="en-US" sz="1600" dirty="0"/>
+              <a:t>                &lt;li&gt;Contact&lt;/li&gt;</a:t>
+            </a:r>
+          </a:p>
+          <a:p>
+            <a:r>
+              <a:rPr lang="en-US" sz="1600" dirty="0"/>
+              <a:t>            &lt;/a&gt;</a:t>
+            </a:r>
+          </a:p>
+          <a:p>
+            <a:r>
+              <a:rPr lang="en-US" sz="1600" dirty="0"/>
+              <a:t>        &lt;/ul&gt;</a:t>
+            </a:r>
+          </a:p>
+          <a:p>
+            <a:r>
+              <a:rPr lang="en-US" sz="1600" dirty="0"/>
+              <a:t>&lt;/header&gt;</a:t>
+            </a:r>
+          </a:p>
+        </p:txBody>
+      </p:sp>
+      <p:sp>
+        <p:nvSpPr>
+          <p:cNvPr id="7" name="TextBox 6">
+            <a:extLst>
+              <a:ext uri="{FF2B5EF4-FFF2-40B4-BE49-F238E27FC236}">
+                <a16:creationId xmlns:a16="http://schemas.microsoft.com/office/drawing/2014/main" id="{B8406C72-39BC-432F-84B2-461F0AAC166B}"/>
+              </a:ext>
+            </a:extLst>
+          </p:cNvPr>
+          <p:cNvSpPr txBox="1"/>
           <p:nvPr/>
-        </p:nvPicPr>
-        <p:blipFill>
-          <a:blip r:embed="rId2"/>
-          <a:stretch>
-            <a:fillRect/>
-          </a:stretch>
-        </p:blipFill>
+        </p:nvSpPr>
         <p:spPr>
           <a:xfrm>
-            <a:off x="900418" y="1349732"/>
-            <a:ext cx="10391164" cy="2582806"/>
+            <a:off x="7332328" y="335845"/>
+            <a:ext cx="4251998" cy="6186309"/>
           </a:xfrm>
           <a:prstGeom prst="rect">
             <a:avLst/>
           </a:prstGeom>
+          <a:noFill/>
+          <a:ln w="38100">
+            <a:solidFill>
+              <a:schemeClr val="tx1"/>
+            </a:solidFill>
+          </a:ln>
         </p:spPr>
-      </p:pic>
+        <p:txBody>
+          <a:bodyPr wrap="none" rtlCol="0">
+            <a:spAutoFit/>
+          </a:bodyPr>
+          <a:lstStyle/>
+          <a:p>
+            <a:r>
+              <a:rPr lang="en-US" sz="2800" b="1" dirty="0"/>
+              <a:t>CSS </a:t>
+            </a:r>
+            <a:r>
+              <a:rPr lang="en-US" sz="2000" b="1" dirty="0"/>
+              <a:t>(styles.css)</a:t>
+            </a:r>
+            <a:endParaRPr lang="en-US" sz="1200" dirty="0"/>
+          </a:p>
+          <a:p>
+            <a:r>
+              <a:rPr lang="en-US" sz="1600" dirty="0"/>
+              <a:t>ul{</a:t>
+            </a:r>
+          </a:p>
+          <a:p>
+            <a:r>
+              <a:rPr lang="en-US" sz="1600" dirty="0"/>
+              <a:t>    background-color: </a:t>
+            </a:r>
+            <a:r>
+              <a:rPr lang="en-US" sz="1600" dirty="0" err="1"/>
+              <a:t>rgb</a:t>
+            </a:r>
+            <a:r>
+              <a:rPr lang="en-US" sz="1600" dirty="0"/>
+              <a:t>(27, 27, 27);</a:t>
+            </a:r>
+          </a:p>
+          <a:p>
+            <a:r>
+              <a:rPr lang="en-US" sz="1600" dirty="0"/>
+              <a:t>    padding: 2%;</a:t>
+            </a:r>
+          </a:p>
+          <a:p>
+            <a:r>
+              <a:rPr lang="en-US" sz="1600" dirty="0"/>
+              <a:t>}</a:t>
+            </a:r>
+            <a:br>
+              <a:rPr lang="en-US" sz="1600" dirty="0"/>
+            </a:br>
+            <a:r>
+              <a:rPr lang="en-US" sz="1600" dirty="0"/>
+              <a:t>li{</a:t>
+            </a:r>
+          </a:p>
+          <a:p>
+            <a:r>
+              <a:rPr lang="en-US" sz="1600" dirty="0"/>
+              <a:t>    display: inline;</a:t>
+            </a:r>
+          </a:p>
+          <a:p>
+            <a:r>
+              <a:rPr lang="en-US" sz="1600" dirty="0"/>
+              <a:t>    padding: 2%;</a:t>
+            </a:r>
+          </a:p>
+          <a:p>
+            <a:r>
+              <a:rPr lang="en-US" sz="1600" dirty="0"/>
+              <a:t>    color: </a:t>
+            </a:r>
+            <a:r>
+              <a:rPr lang="en-US" sz="1600" dirty="0" err="1"/>
+              <a:t>lightblue</a:t>
+            </a:r>
+            <a:r>
+              <a:rPr lang="en-US" sz="1600" dirty="0"/>
+              <a:t>;</a:t>
+            </a:r>
+          </a:p>
+          <a:p>
+            <a:r>
+              <a:rPr lang="en-US" sz="1600" dirty="0"/>
+              <a:t>    font-size: x-large;</a:t>
+            </a:r>
+          </a:p>
+          <a:p>
+            <a:r>
+              <a:rPr lang="en-US" sz="1600" dirty="0"/>
+              <a:t>    text-shadow: 2px </a:t>
+            </a:r>
+            <a:r>
+              <a:rPr lang="en-US" sz="1600" dirty="0" err="1"/>
+              <a:t>2px</a:t>
+            </a:r>
+            <a:r>
+              <a:rPr lang="en-US" sz="1600" dirty="0"/>
+              <a:t> blue;</a:t>
+            </a:r>
+          </a:p>
+          <a:p>
+            <a:r>
+              <a:rPr lang="en-US" sz="1600" dirty="0"/>
+              <a:t>    font-weight: bold;</a:t>
+            </a:r>
+          </a:p>
+          <a:p>
+            <a:r>
+              <a:rPr lang="en-US" sz="1600" dirty="0"/>
+              <a:t>    text-decoration: none;</a:t>
+            </a:r>
+          </a:p>
+          <a:p>
+            <a:r>
+              <a:rPr lang="en-US" sz="1600" dirty="0"/>
+              <a:t>}</a:t>
+            </a:r>
+          </a:p>
+          <a:p>
+            <a:r>
+              <a:rPr lang="en-US" sz="1600" dirty="0" err="1"/>
+              <a:t>li:hover</a:t>
+            </a:r>
+            <a:r>
+              <a:rPr lang="en-US" sz="1600" dirty="0"/>
+              <a:t>{ </a:t>
+            </a:r>
+            <a:r>
+              <a:rPr lang="en-US" sz="1600" dirty="0" err="1"/>
+              <a:t>background-color:slategrey</a:t>
+            </a:r>
+            <a:r>
+              <a:rPr lang="en-US" sz="1600" dirty="0"/>
+              <a:t>; }</a:t>
+            </a:r>
+          </a:p>
+          <a:p>
+            <a:r>
+              <a:rPr lang="en-US" sz="1600" dirty="0"/>
+              <a:t>a{ text-decoration: none; }</a:t>
+            </a:r>
+          </a:p>
+          <a:p>
+            <a:r>
+              <a:rPr lang="en-US" sz="1600" dirty="0"/>
+              <a:t>span{</a:t>
+            </a:r>
+          </a:p>
+          <a:p>
+            <a:r>
+              <a:rPr lang="en-US" sz="1600" dirty="0"/>
+              <a:t>    color: </a:t>
+            </a:r>
+            <a:r>
+              <a:rPr lang="en-US" sz="1600" dirty="0" err="1"/>
+              <a:t>peachpuff</a:t>
+            </a:r>
+            <a:r>
+              <a:rPr lang="en-US" sz="1600" dirty="0"/>
+              <a:t>;</a:t>
+            </a:r>
+          </a:p>
+          <a:p>
+            <a:r>
+              <a:rPr lang="en-US" sz="1600" dirty="0"/>
+              <a:t>    font-size: xx-large;</a:t>
+            </a:r>
+          </a:p>
+          <a:p>
+            <a:r>
+              <a:rPr lang="en-US" sz="1600" dirty="0"/>
+              <a:t>    font-weight: bolder;</a:t>
+            </a:r>
+          </a:p>
+          <a:p>
+            <a:r>
+              <a:rPr lang="en-US" sz="1600" dirty="0"/>
+              <a:t>    </a:t>
+            </a:r>
+            <a:r>
+              <a:rPr lang="en-US" sz="1600" dirty="0" err="1"/>
+              <a:t>cursor:no-drop</a:t>
+            </a:r>
+            <a:r>
+              <a:rPr lang="en-US" sz="1600" dirty="0"/>
+              <a:t>;</a:t>
+            </a:r>
+          </a:p>
+          <a:p>
+            <a:r>
+              <a:rPr lang="en-US" sz="1600" dirty="0"/>
+              <a:t>    text-shadow: 2px </a:t>
+            </a:r>
+            <a:r>
+              <a:rPr lang="en-US" sz="1600" dirty="0" err="1"/>
+              <a:t>2px</a:t>
+            </a:r>
+            <a:r>
+              <a:rPr lang="en-US" sz="1600" dirty="0"/>
+              <a:t> </a:t>
+            </a:r>
+            <a:r>
+              <a:rPr lang="en-US" sz="1600" dirty="0" err="1"/>
+              <a:t>orangered</a:t>
+            </a:r>
+            <a:r>
+              <a:rPr lang="en-US" sz="1600" dirty="0"/>
+              <a:t>;</a:t>
+            </a:r>
+          </a:p>
+          <a:p>
+            <a:r>
+              <a:rPr lang="en-US" sz="1600" dirty="0"/>
+              <a:t>}</a:t>
+            </a:r>
+            <a:br>
+              <a:rPr lang="en-US" sz="1600" dirty="0"/>
+            </a:br>
+            <a:r>
+              <a:rPr lang="en-US" sz="1600" dirty="0"/>
+              <a:t>span::selection{ background-color: transparent; }</a:t>
+            </a:r>
+          </a:p>
+        </p:txBody>
+      </p:sp>
     </p:spTree>
     <p:extLst>
       <p:ext uri="{BB962C8B-B14F-4D97-AF65-F5344CB8AC3E}">
-        <p14:creationId xmlns:p14="http://schemas.microsoft.com/office/powerpoint/2010/main" val="1922963660"/>
+        <p14:creationId xmlns:p14="http://schemas.microsoft.com/office/powerpoint/2010/main" val="4197318355"/>
       </p:ext>
     </p:extLst>
   </p:cSld>
@@ -4458,7 +5150,7 @@
 </p:sld>
 </file>
 
-<file path=ppt/slides/slide13.xml><?xml version="1.0" encoding="utf-8"?>
+<file path=ppt/slides/slide14.xml><?xml version="1.0" encoding="utf-8"?>
 <p:sld xmlns:a="http://schemas.openxmlformats.org/drawingml/2006/main" xmlns:r="http://schemas.openxmlformats.org/officeDocument/2006/relationships" xmlns:p="http://schemas.openxmlformats.org/presentationml/2006/main">
   <p:cSld>
     <p:spTree>
@@ -4571,288 +5263,6 @@
 </p:sld>
 </file>
 
-<file path=ppt/slides/slide14.xml><?xml version="1.0" encoding="utf-8"?>
-<p:sld xmlns:a="http://schemas.openxmlformats.org/drawingml/2006/main" xmlns:r="http://schemas.openxmlformats.org/officeDocument/2006/relationships" xmlns:p="http://schemas.openxmlformats.org/presentationml/2006/main">
-  <p:cSld>
-    <p:spTree>
-      <p:nvGrpSpPr>
-        <p:cNvPr id="1" name=""/>
-        <p:cNvGrpSpPr/>
-        <p:nvPr/>
-      </p:nvGrpSpPr>
-      <p:grpSpPr>
-        <a:xfrm>
-          <a:off x="0" y="0"/>
-          <a:ext cx="0" cy="0"/>
-          <a:chOff x="0" y="0"/>
-          <a:chExt cx="0" cy="0"/>
-        </a:xfrm>
-      </p:grpSpPr>
-      <p:sp>
-        <p:nvSpPr>
-          <p:cNvPr id="2" name="Title 1">
-            <a:extLst>
-              <a:ext uri="{FF2B5EF4-FFF2-40B4-BE49-F238E27FC236}">
-                <a16:creationId xmlns:a16="http://schemas.microsoft.com/office/drawing/2014/main" id="{A3B10D37-35D8-44FB-8C77-B3901EE3A4D3}"/>
-              </a:ext>
-            </a:extLst>
-          </p:cNvPr>
-          <p:cNvSpPr>
-            <a:spLocks noGrp="1"/>
-          </p:cNvSpPr>
-          <p:nvPr>
-            <p:ph type="title"/>
-          </p:nvPr>
-        </p:nvSpPr>
-        <p:spPr>
-          <a:xfrm>
-            <a:off x="95250" y="1242218"/>
-            <a:ext cx="10515600" cy="1325563"/>
-          </a:xfrm>
-        </p:spPr>
-        <p:txBody>
-          <a:bodyPr/>
-          <a:lstStyle/>
-          <a:p>
-            <a:r>
-              <a:rPr lang="en-US" dirty="0"/>
-              <a:t>Day 6: Create The Contact Form</a:t>
-            </a:r>
-          </a:p>
-        </p:txBody>
-      </p:sp>
-      <p:sp>
-        <p:nvSpPr>
-          <p:cNvPr id="4" name="TextBox 3">
-            <a:extLst>
-              <a:ext uri="{FF2B5EF4-FFF2-40B4-BE49-F238E27FC236}">
-                <a16:creationId xmlns:a16="http://schemas.microsoft.com/office/drawing/2014/main" id="{50EB3C73-FFA6-45B0-8D4D-A86E5FB18C45}"/>
-              </a:ext>
-            </a:extLst>
-          </p:cNvPr>
-          <p:cNvSpPr txBox="1"/>
-          <p:nvPr/>
-        </p:nvSpPr>
-        <p:spPr>
-          <a:xfrm>
-            <a:off x="161925" y="2309244"/>
-            <a:ext cx="10059164" cy="4462760"/>
-          </a:xfrm>
-          <a:prstGeom prst="rect">
-            <a:avLst/>
-          </a:prstGeom>
-          <a:noFill/>
-          <a:ln w="38100">
-            <a:solidFill>
-              <a:schemeClr val="tx1"/>
-            </a:solidFill>
-          </a:ln>
-        </p:spPr>
-        <p:txBody>
-          <a:bodyPr wrap="none" rtlCol="0">
-            <a:spAutoFit/>
-          </a:bodyPr>
-          <a:lstStyle/>
-          <a:p>
-            <a:r>
-              <a:rPr lang="en-US" sz="3200" b="1" dirty="0"/>
-              <a:t>HTML </a:t>
-            </a:r>
-            <a:r>
-              <a:rPr lang="en-US" sz="2400" b="1" dirty="0"/>
-              <a:t>(contact.html)</a:t>
-            </a:r>
-            <a:endParaRPr lang="en-US" sz="1400" b="1" dirty="0"/>
-          </a:p>
-          <a:p>
-            <a:r>
-              <a:rPr lang="en-US" dirty="0"/>
-              <a:t>&lt;div style="background-color: </a:t>
-            </a:r>
-            <a:r>
-              <a:rPr lang="en-US" dirty="0" err="1"/>
-              <a:t>aliceblue</a:t>
-            </a:r>
-            <a:r>
-              <a:rPr lang="en-US" dirty="0"/>
-              <a:t>; width: 40%; height: 40%; text-align: center"&gt;</a:t>
-            </a:r>
-          </a:p>
-          <a:p>
-            <a:r>
-              <a:rPr lang="en-US" dirty="0"/>
-              <a:t>        &lt;h1&gt;Contact Us!&lt;/h1&gt;</a:t>
-            </a:r>
-          </a:p>
-          <a:p>
-            <a:r>
-              <a:rPr lang="en-US" dirty="0"/>
-              <a:t>        &lt;form&gt;</a:t>
-            </a:r>
-          </a:p>
-          <a:p>
-            <a:r>
-              <a:rPr lang="en-US" dirty="0"/>
-              <a:t>            &lt;b&gt;</a:t>
-            </a:r>
-          </a:p>
-          <a:p>
-            <a:r>
-              <a:rPr lang="en-US" dirty="0"/>
-              <a:t>	Name: &lt;input type="text" placeholder="Enter your name"&gt;   </a:t>
-            </a:r>
-          </a:p>
-          <a:p>
-            <a:r>
-              <a:rPr lang="en-US" dirty="0"/>
-              <a:t>	Email: &lt;input type="text" placeholder="Enter your email"&gt; </a:t>
-            </a:r>
-          </a:p>
-          <a:p>
-            <a:r>
-              <a:rPr lang="en-US" dirty="0"/>
-              <a:t>            &lt;/b&gt;</a:t>
-            </a:r>
-          </a:p>
-          <a:p>
-            <a:r>
-              <a:rPr lang="en-US" dirty="0"/>
-              <a:t>            &lt;</a:t>
-            </a:r>
-            <a:r>
-              <a:rPr lang="en-US" dirty="0" err="1"/>
-              <a:t>br</a:t>
-            </a:r>
-            <a:r>
-              <a:rPr lang="en-US" dirty="0"/>
-              <a:t>&gt;&lt;</a:t>
-            </a:r>
-            <a:r>
-              <a:rPr lang="en-US" dirty="0" err="1"/>
-              <a:t>br</a:t>
-            </a:r>
-            <a:r>
-              <a:rPr lang="en-US" dirty="0"/>
-              <a:t>&gt;</a:t>
-            </a:r>
-          </a:p>
-          <a:p>
-            <a:r>
-              <a:rPr lang="en-US" dirty="0"/>
-              <a:t>            &lt;</a:t>
-            </a:r>
-            <a:r>
-              <a:rPr lang="en-US" dirty="0" err="1"/>
-              <a:t>textarea</a:t>
-            </a:r>
-            <a:r>
-              <a:rPr lang="en-US" dirty="0"/>
-              <a:t> style="</a:t>
-            </a:r>
-            <a:r>
-              <a:rPr lang="en-US" dirty="0" err="1"/>
-              <a:t>resize:none</a:t>
-            </a:r>
-            <a:r>
-              <a:rPr lang="en-US" dirty="0"/>
-              <a:t>" placeholder="Enter your comment" cols="52" rows="8"&gt;&lt;/</a:t>
-            </a:r>
-            <a:r>
-              <a:rPr lang="en-US" dirty="0" err="1"/>
-              <a:t>textarea</a:t>
-            </a:r>
-            <a:r>
-              <a:rPr lang="en-US" dirty="0"/>
-              <a:t>&gt;</a:t>
-            </a:r>
-          </a:p>
-          <a:p>
-            <a:r>
-              <a:rPr lang="en-US" dirty="0"/>
-              <a:t>            &lt;</a:t>
-            </a:r>
-            <a:r>
-              <a:rPr lang="en-US" dirty="0" err="1"/>
-              <a:t>br</a:t>
-            </a:r>
-            <a:r>
-              <a:rPr lang="en-US" dirty="0"/>
-              <a:t>&gt;&lt;</a:t>
-            </a:r>
-            <a:r>
-              <a:rPr lang="en-US" dirty="0" err="1"/>
-              <a:t>br</a:t>
-            </a:r>
-            <a:r>
-              <a:rPr lang="en-US" dirty="0"/>
-              <a:t>&gt;</a:t>
-            </a:r>
-          </a:p>
-          <a:p>
-            <a:r>
-              <a:rPr lang="en-US" dirty="0"/>
-              <a:t>            &lt;input type="button" value="Submit" onclick="submit()"&gt;</a:t>
-            </a:r>
-          </a:p>
-          <a:p>
-            <a:r>
-              <a:rPr lang="en-US" dirty="0"/>
-              <a:t>        &lt;/form&gt;</a:t>
-            </a:r>
-          </a:p>
-          <a:p>
-            <a:r>
-              <a:rPr lang="en-US" dirty="0"/>
-              <a:t>    &lt;/div&gt;</a:t>
-            </a:r>
-          </a:p>
-          <a:p>
-            <a:endParaRPr lang="en-US" dirty="0"/>
-          </a:p>
-        </p:txBody>
-      </p:sp>
-      <p:pic>
-        <p:nvPicPr>
-          <p:cNvPr id="5" name="Picture 4">
-            <a:extLst>
-              <a:ext uri="{FF2B5EF4-FFF2-40B4-BE49-F238E27FC236}">
-                <a16:creationId xmlns:a16="http://schemas.microsoft.com/office/drawing/2014/main" id="{4AA45268-2785-45E6-A39F-206F504538E9}"/>
-              </a:ext>
-            </a:extLst>
-          </p:cNvPr>
-          <p:cNvPicPr>
-            <a:picLocks noChangeAspect="1"/>
-          </p:cNvPicPr>
-          <p:nvPr/>
-        </p:nvPicPr>
-        <p:blipFill rotWithShape="1">
-          <a:blip r:embed="rId2"/>
-          <a:srcRect l="15855" t="26486" r="27976" b="20183"/>
-          <a:stretch/>
-        </p:blipFill>
-        <p:spPr>
-          <a:xfrm>
-            <a:off x="7274716" y="13493"/>
-            <a:ext cx="4917284" cy="2809876"/>
-          </a:xfrm>
-          <a:prstGeom prst="rect">
-            <a:avLst/>
-          </a:prstGeom>
-        </p:spPr>
-      </p:pic>
-    </p:spTree>
-    <p:extLst>
-      <p:ext uri="{BB962C8B-B14F-4D97-AF65-F5344CB8AC3E}">
-        <p14:creationId xmlns:p14="http://schemas.microsoft.com/office/powerpoint/2010/main" val="3404208113"/>
-      </p:ext>
-    </p:extLst>
-  </p:cSld>
-  <p:clrMapOvr>
-    <a:masterClrMapping/>
-  </p:clrMapOvr>
-</p:sld>
-</file>
-
 <file path=ppt/slides/slide15.xml><?xml version="1.0" encoding="utf-8"?>
 <p:sld xmlns:a="http://schemas.openxmlformats.org/drawingml/2006/main" xmlns:r="http://schemas.openxmlformats.org/officeDocument/2006/relationships" xmlns:p="http://schemas.openxmlformats.org/presentationml/2006/main">
   <p:cSld>
@@ -4886,6 +5296,293 @@
             <p:ph type="title"/>
           </p:nvPr>
         </p:nvSpPr>
+        <p:spPr>
+          <a:xfrm>
+            <a:off x="95250" y="1242218"/>
+            <a:ext cx="10515600" cy="1325563"/>
+          </a:xfrm>
+        </p:spPr>
+        <p:txBody>
+          <a:bodyPr/>
+          <a:lstStyle/>
+          <a:p>
+            <a:r>
+              <a:rPr lang="en-US" dirty="0"/>
+              <a:t>Day 6: Create The Contact Form</a:t>
+            </a:r>
+          </a:p>
+        </p:txBody>
+      </p:sp>
+      <p:sp>
+        <p:nvSpPr>
+          <p:cNvPr id="4" name="TextBox 3">
+            <a:extLst>
+              <a:ext uri="{FF2B5EF4-FFF2-40B4-BE49-F238E27FC236}">
+                <a16:creationId xmlns:a16="http://schemas.microsoft.com/office/drawing/2014/main" id="{50EB3C73-FFA6-45B0-8D4D-A86E5FB18C45}"/>
+              </a:ext>
+            </a:extLst>
+          </p:cNvPr>
+          <p:cNvSpPr txBox="1"/>
+          <p:nvPr/>
+        </p:nvSpPr>
+        <p:spPr>
+          <a:xfrm>
+            <a:off x="161925" y="2309244"/>
+            <a:ext cx="10059164" cy="4462760"/>
+          </a:xfrm>
+          <a:prstGeom prst="rect">
+            <a:avLst/>
+          </a:prstGeom>
+          <a:noFill/>
+          <a:ln w="38100">
+            <a:solidFill>
+              <a:schemeClr val="tx1"/>
+            </a:solidFill>
+          </a:ln>
+        </p:spPr>
+        <p:txBody>
+          <a:bodyPr wrap="none" rtlCol="0">
+            <a:spAutoFit/>
+          </a:bodyPr>
+          <a:lstStyle/>
+          <a:p>
+            <a:r>
+              <a:rPr lang="en-US" sz="3200" b="1" dirty="0"/>
+              <a:t>HTML </a:t>
+            </a:r>
+            <a:r>
+              <a:rPr lang="en-US" sz="2400" b="1" dirty="0"/>
+              <a:t>(contact.html)</a:t>
+            </a:r>
+            <a:endParaRPr lang="en-US" sz="1400" b="1" dirty="0"/>
+          </a:p>
+          <a:p>
+            <a:r>
+              <a:rPr lang="en-US" dirty="0"/>
+              <a:t>&lt;div style="background-color: </a:t>
+            </a:r>
+            <a:r>
+              <a:rPr lang="en-US" dirty="0" err="1"/>
+              <a:t>aliceblue</a:t>
+            </a:r>
+            <a:r>
+              <a:rPr lang="en-US" dirty="0"/>
+              <a:t>; width: 40%; height: 40%; text-align: center"&gt;</a:t>
+            </a:r>
+          </a:p>
+          <a:p>
+            <a:r>
+              <a:rPr lang="en-US" dirty="0"/>
+              <a:t>        &lt;h1&gt;Contact Us!&lt;/h1&gt;</a:t>
+            </a:r>
+          </a:p>
+          <a:p>
+            <a:r>
+              <a:rPr lang="en-US" dirty="0"/>
+              <a:t>        &lt;form&gt;</a:t>
+            </a:r>
+          </a:p>
+          <a:p>
+            <a:r>
+              <a:rPr lang="en-US" dirty="0"/>
+              <a:t>            &lt;b&gt;</a:t>
+            </a:r>
+          </a:p>
+          <a:p>
+            <a:r>
+              <a:rPr lang="en-US" dirty="0"/>
+              <a:t>	Name: &lt;input type="text" placeholder="Enter your name"&gt;   </a:t>
+            </a:r>
+          </a:p>
+          <a:p>
+            <a:r>
+              <a:rPr lang="en-US" dirty="0"/>
+              <a:t>	Email: &lt;input type="text" placeholder="Enter your email"&gt; </a:t>
+            </a:r>
+          </a:p>
+          <a:p>
+            <a:r>
+              <a:rPr lang="en-US" dirty="0"/>
+              <a:t>            &lt;/b&gt;</a:t>
+            </a:r>
+          </a:p>
+          <a:p>
+            <a:r>
+              <a:rPr lang="en-US" dirty="0"/>
+              <a:t>            &lt;</a:t>
+            </a:r>
+            <a:r>
+              <a:rPr lang="en-US" dirty="0" err="1"/>
+              <a:t>br</a:t>
+            </a:r>
+            <a:r>
+              <a:rPr lang="en-US" dirty="0"/>
+              <a:t>&gt;&lt;</a:t>
+            </a:r>
+            <a:r>
+              <a:rPr lang="en-US" dirty="0" err="1"/>
+              <a:t>br</a:t>
+            </a:r>
+            <a:r>
+              <a:rPr lang="en-US" dirty="0"/>
+              <a:t>&gt;</a:t>
+            </a:r>
+          </a:p>
+          <a:p>
+            <a:r>
+              <a:rPr lang="en-US" dirty="0"/>
+              <a:t>            &lt;</a:t>
+            </a:r>
+            <a:r>
+              <a:rPr lang="en-US" dirty="0" err="1"/>
+              <a:t>textarea</a:t>
+            </a:r>
+            <a:r>
+              <a:rPr lang="en-US" dirty="0"/>
+              <a:t> style="</a:t>
+            </a:r>
+            <a:r>
+              <a:rPr lang="en-US" dirty="0" err="1"/>
+              <a:t>resize:none</a:t>
+            </a:r>
+            <a:r>
+              <a:rPr lang="en-US" dirty="0"/>
+              <a:t>" placeholder="Enter your comment" cols="52" rows="8"&gt;&lt;/</a:t>
+            </a:r>
+            <a:r>
+              <a:rPr lang="en-US" dirty="0" err="1"/>
+              <a:t>textarea</a:t>
+            </a:r>
+            <a:r>
+              <a:rPr lang="en-US" dirty="0"/>
+              <a:t>&gt;</a:t>
+            </a:r>
+          </a:p>
+          <a:p>
+            <a:r>
+              <a:rPr lang="en-US" dirty="0"/>
+              <a:t>            &lt;</a:t>
+            </a:r>
+            <a:r>
+              <a:rPr lang="en-US" dirty="0" err="1"/>
+              <a:t>br</a:t>
+            </a:r>
+            <a:r>
+              <a:rPr lang="en-US" dirty="0"/>
+              <a:t>&gt;&lt;</a:t>
+            </a:r>
+            <a:r>
+              <a:rPr lang="en-US" dirty="0" err="1"/>
+              <a:t>br</a:t>
+            </a:r>
+            <a:r>
+              <a:rPr lang="en-US" dirty="0"/>
+              <a:t>&gt;</a:t>
+            </a:r>
+          </a:p>
+          <a:p>
+            <a:r>
+              <a:rPr lang="en-US" dirty="0"/>
+              <a:t>            &lt;input type="button" value="Submit" onclick="submit()"&gt;</a:t>
+            </a:r>
+          </a:p>
+          <a:p>
+            <a:r>
+              <a:rPr lang="en-US" dirty="0"/>
+              <a:t>        &lt;/form&gt;</a:t>
+            </a:r>
+          </a:p>
+          <a:p>
+            <a:r>
+              <a:rPr lang="en-US" dirty="0"/>
+              <a:t>    &lt;/div&gt;</a:t>
+            </a:r>
+          </a:p>
+          <a:p>
+            <a:endParaRPr lang="en-US" dirty="0"/>
+          </a:p>
+        </p:txBody>
+      </p:sp>
+      <p:pic>
+        <p:nvPicPr>
+          <p:cNvPr id="5" name="Picture 4">
+            <a:extLst>
+              <a:ext uri="{FF2B5EF4-FFF2-40B4-BE49-F238E27FC236}">
+                <a16:creationId xmlns:a16="http://schemas.microsoft.com/office/drawing/2014/main" id="{4AA45268-2785-45E6-A39F-206F504538E9}"/>
+              </a:ext>
+            </a:extLst>
+          </p:cNvPr>
+          <p:cNvPicPr>
+            <a:picLocks noChangeAspect="1"/>
+          </p:cNvPicPr>
+          <p:nvPr/>
+        </p:nvPicPr>
+        <p:blipFill rotWithShape="1">
+          <a:blip r:embed="rId2"/>
+          <a:srcRect l="15855" t="26486" r="27976" b="20183"/>
+          <a:stretch/>
+        </p:blipFill>
+        <p:spPr>
+          <a:xfrm>
+            <a:off x="7370970" y="13493"/>
+            <a:ext cx="4821030" cy="2754874"/>
+          </a:xfrm>
+          <a:prstGeom prst="rect">
+            <a:avLst/>
+          </a:prstGeom>
+          <a:ln w="38100">
+            <a:solidFill>
+              <a:schemeClr val="tx1"/>
+            </a:solidFill>
+          </a:ln>
+        </p:spPr>
+      </p:pic>
+    </p:spTree>
+    <p:extLst>
+      <p:ext uri="{BB962C8B-B14F-4D97-AF65-F5344CB8AC3E}">
+        <p14:creationId xmlns:p14="http://schemas.microsoft.com/office/powerpoint/2010/main" val="3404208113"/>
+      </p:ext>
+    </p:extLst>
+  </p:cSld>
+  <p:clrMapOvr>
+    <a:masterClrMapping/>
+  </p:clrMapOvr>
+</p:sld>
+</file>
+
+<file path=ppt/slides/slide16.xml><?xml version="1.0" encoding="utf-8"?>
+<p:sld xmlns:a="http://schemas.openxmlformats.org/drawingml/2006/main" xmlns:r="http://schemas.openxmlformats.org/officeDocument/2006/relationships" xmlns:p="http://schemas.openxmlformats.org/presentationml/2006/main">
+  <p:cSld>
+    <p:spTree>
+      <p:nvGrpSpPr>
+        <p:cNvPr id="1" name=""/>
+        <p:cNvGrpSpPr/>
+        <p:nvPr/>
+      </p:nvGrpSpPr>
+      <p:grpSpPr>
+        <a:xfrm>
+          <a:off x="0" y="0"/>
+          <a:ext cx="0" cy="0"/>
+          <a:chOff x="0" y="0"/>
+          <a:chExt cx="0" cy="0"/>
+        </a:xfrm>
+      </p:grpSpPr>
+      <p:sp>
+        <p:nvSpPr>
+          <p:cNvPr id="2" name="Title 1">
+            <a:extLst>
+              <a:ext uri="{FF2B5EF4-FFF2-40B4-BE49-F238E27FC236}">
+                <a16:creationId xmlns:a16="http://schemas.microsoft.com/office/drawing/2014/main" id="{A3B10D37-35D8-44FB-8C77-B3901EE3A4D3}"/>
+              </a:ext>
+            </a:extLst>
+          </p:cNvPr>
+          <p:cNvSpPr>
+            <a:spLocks noGrp="1"/>
+          </p:cNvSpPr>
+          <p:nvPr>
+            <p:ph type="title"/>
+          </p:nvPr>
+        </p:nvSpPr>
         <p:spPr/>
         <p:txBody>
           <a:bodyPr/>
@@ -4893,7 +5590,7 @@
           <a:p>
             <a:r>
               <a:rPr lang="en-US" dirty="0"/>
-              <a:t>Day 7: Catchup + Go The Extra Mile!</a:t>
+              <a:t>Day 7: Catchup / Bonus</a:t>
             </a:r>
           </a:p>
         </p:txBody>
@@ -4939,10 +5636,12 @@
           <a:p>
             <a:r>
               <a:rPr lang="en-US" dirty="0"/>
-              <a:t>Create a form for store owners to add new products</a:t>
-            </a:r>
-          </a:p>
-          <a:p>
+              <a:t>Create a form for store owners to add </a:t>
+            </a:r>
+            <a:r>
+              <a:rPr lang="en-US"/>
+              <a:t>new products</a:t>
+            </a:r>
             <a:endParaRPr lang="en-US" dirty="0"/>
           </a:p>
           <a:p>
@@ -5405,7 +6104,7 @@
           <a:p>
             <a:r>
               <a:rPr lang="en-US" dirty="0"/>
-              <a:t>Day 2: Create An Item Container</a:t>
+              <a:t>Day 1: Create Images For Products</a:t>
             </a:r>
           </a:p>
         </p:txBody>
@@ -5426,13 +6125,13 @@
         </p:nvPicPr>
         <p:blipFill rotWithShape="1">
           <a:blip r:embed="rId2"/>
-          <a:srcRect l="76266" t="18418" b="42524"/>
+          <a:srcRect l="79321" t="73177" r="2663" b="7634"/>
           <a:stretch/>
         </p:blipFill>
         <p:spPr>
-          <a:xfrm>
-            <a:off x="4528355" y="1655603"/>
-            <a:ext cx="2541865" cy="1929469"/>
+          <a:xfrm rot="19929008">
+            <a:off x="427488" y="1740406"/>
+            <a:ext cx="1929469" cy="947957"/>
           </a:xfrm>
           <a:prstGeom prst="rect">
             <a:avLst/>
@@ -5444,7 +6143,7 @@
           <p:cNvPr id="5" name="Picture 4">
             <a:extLst>
               <a:ext uri="{FF2B5EF4-FFF2-40B4-BE49-F238E27FC236}">
-                <a16:creationId xmlns:a16="http://schemas.microsoft.com/office/drawing/2014/main" id="{DDF427E8-3ECF-477B-83AE-D4E4F5BDCAE4}"/>
+                <a16:creationId xmlns:a16="http://schemas.microsoft.com/office/drawing/2014/main" id="{64A3D6A5-7A12-4907-8A83-EEB248A4CB46}"/>
               </a:ext>
             </a:extLst>
           </p:cNvPr>
@@ -5455,13 +6154,13 @@
         </p:nvPicPr>
         <p:blipFill rotWithShape="1">
           <a:blip r:embed="rId2"/>
-          <a:srcRect l="51279" t="18418" r="24987" b="42524"/>
+          <a:srcRect l="57467" t="29966" r="25849" b="50845"/>
           <a:stretch/>
         </p:blipFill>
         <p:spPr>
-          <a:xfrm>
-            <a:off x="903399" y="1635848"/>
-            <a:ext cx="2541864" cy="1929469"/>
+          <a:xfrm rot="2015532">
+            <a:off x="4838559" y="1928623"/>
+            <a:ext cx="1786855" cy="947957"/>
           </a:xfrm>
           <a:prstGeom prst="rect">
             <a:avLst/>
@@ -5473,7 +6172,7 @@
           <p:cNvPr id="6" name="Picture 5">
             <a:extLst>
               <a:ext uri="{FF2B5EF4-FFF2-40B4-BE49-F238E27FC236}">
-                <a16:creationId xmlns:a16="http://schemas.microsoft.com/office/drawing/2014/main" id="{5CD7CB7C-C4B7-414C-A7C5-DC15A3CA1789}"/>
+                <a16:creationId xmlns:a16="http://schemas.microsoft.com/office/drawing/2014/main" id="{4C46BCB9-71FD-48E7-AD17-51EAF28F61CA}"/>
               </a:ext>
             </a:extLst>
           </p:cNvPr>
@@ -5484,13 +6183,13 @@
         </p:nvPicPr>
         <p:blipFill rotWithShape="1">
           <a:blip r:embed="rId2"/>
-          <a:srcRect l="76477" t="61059" r="-211" b="-117"/>
+          <a:srcRect l="83316" t="29966" b="50845"/>
           <a:stretch/>
         </p:blipFill>
         <p:spPr>
           <a:xfrm>
-            <a:off x="8470462" y="1635849"/>
-            <a:ext cx="2541865" cy="1929469"/>
+            <a:off x="2785144" y="1344622"/>
+            <a:ext cx="1786855" cy="947957"/>
           </a:xfrm>
           <a:prstGeom prst="rect">
             <a:avLst/>
@@ -5502,7 +6201,7 @@
           <p:cNvPr id="7" name="TextBox 6">
             <a:extLst>
               <a:ext uri="{FF2B5EF4-FFF2-40B4-BE49-F238E27FC236}">
-                <a16:creationId xmlns:a16="http://schemas.microsoft.com/office/drawing/2014/main" id="{50CE2AEF-362D-4DFF-9366-F8EC0BB736B7}"/>
+                <a16:creationId xmlns:a16="http://schemas.microsoft.com/office/drawing/2014/main" id="{59E0DB39-A418-437C-BFC5-BB9D5B858D98}"/>
               </a:ext>
             </a:extLst>
           </p:cNvPr>
@@ -5510,9 +6209,9 @@
           <p:nvPr/>
         </p:nvSpPr>
         <p:spPr>
-          <a:xfrm>
-            <a:off x="1820254" y="3931065"/>
-            <a:ext cx="1097929" cy="369332"/>
+          <a:xfrm rot="20210245">
+            <a:off x="1283165" y="2665664"/>
+            <a:ext cx="748025" cy="369332"/>
           </a:xfrm>
           <a:prstGeom prst="rect">
             <a:avLst/>
@@ -5527,7 +6226,7 @@
           <a:p>
             <a:r>
               <a:rPr lang="en-US" dirty="0"/>
-              <a:t>New Item</a:t>
+              <a:t>Pillow</a:t>
             </a:r>
           </a:p>
         </p:txBody>
@@ -5537,7 +6236,7 @@
           <p:cNvPr id="8" name="TextBox 7">
             <a:extLst>
               <a:ext uri="{FF2B5EF4-FFF2-40B4-BE49-F238E27FC236}">
-                <a16:creationId xmlns:a16="http://schemas.microsoft.com/office/drawing/2014/main" id="{21A695D7-6EAD-4C5D-A3DF-E01ED82AA17E}"/>
+                <a16:creationId xmlns:a16="http://schemas.microsoft.com/office/drawing/2014/main" id="{77E41D42-49F2-426D-A97F-5CE6A6A4D58F}"/>
               </a:ext>
             </a:extLst>
           </p:cNvPr>
@@ -5546,8 +6245,8 @@
         </p:nvSpPr>
         <p:spPr>
           <a:xfrm>
-            <a:off x="5272187" y="3932927"/>
-            <a:ext cx="1054199" cy="369332"/>
+            <a:off x="3183147" y="2296773"/>
+            <a:ext cx="825867" cy="369332"/>
           </a:xfrm>
           <a:prstGeom prst="rect">
             <a:avLst/>
@@ -5562,7 +6261,7 @@
           <a:p>
             <a:r>
               <a:rPr lang="en-US" dirty="0"/>
-              <a:t>Sale Item</a:t>
+              <a:t>Beanie</a:t>
             </a:r>
           </a:p>
         </p:txBody>
@@ -5572,7 +6271,7 @@
           <p:cNvPr id="9" name="TextBox 8">
             <a:extLst>
               <a:ext uri="{FF2B5EF4-FFF2-40B4-BE49-F238E27FC236}">
-                <a16:creationId xmlns:a16="http://schemas.microsoft.com/office/drawing/2014/main" id="{FBD2A4C8-FCA3-4F56-8014-E19C0D93F4D5}"/>
+                <a16:creationId xmlns:a16="http://schemas.microsoft.com/office/drawing/2014/main" id="{59C2130F-35B1-4EB6-9207-69E52E9D5CC0}"/>
               </a:ext>
             </a:extLst>
           </p:cNvPr>
@@ -5580,9 +6279,9 @@
           <p:nvPr/>
         </p:nvSpPr>
         <p:spPr>
-          <a:xfrm>
-            <a:off x="8991368" y="3862699"/>
-            <a:ext cx="1380378" cy="369332"/>
+          <a:xfrm rot="1824400">
+            <a:off x="4953696" y="2737574"/>
+            <a:ext cx="695383" cy="369332"/>
           </a:xfrm>
           <a:prstGeom prst="rect">
             <a:avLst/>
@@ -5597,7 +6296,116 @@
           <a:p>
             <a:r>
               <a:rPr lang="en-US" dirty="0"/>
-              <a:t>Regular Item</a:t>
+              <a:t>Pants</a:t>
+            </a:r>
+          </a:p>
+        </p:txBody>
+      </p:sp>
+      <p:sp>
+        <p:nvSpPr>
+          <p:cNvPr id="10" name="TextBox 9">
+            <a:extLst>
+              <a:ext uri="{FF2B5EF4-FFF2-40B4-BE49-F238E27FC236}">
+                <a16:creationId xmlns:a16="http://schemas.microsoft.com/office/drawing/2014/main" id="{8943C5B7-88BB-4C89-9F2B-81CA24EDF7D8}"/>
+              </a:ext>
+            </a:extLst>
+          </p:cNvPr>
+          <p:cNvSpPr txBox="1"/>
+          <p:nvPr/>
+        </p:nvSpPr>
+        <p:spPr>
+          <a:xfrm>
+            <a:off x="6671157" y="2214384"/>
+            <a:ext cx="5438273" cy="1692771"/>
+          </a:xfrm>
+          <a:prstGeom prst="rect">
+            <a:avLst/>
+          </a:prstGeom>
+          <a:noFill/>
+          <a:ln w="57150">
+            <a:solidFill>
+              <a:schemeClr val="tx1"/>
+            </a:solidFill>
+          </a:ln>
+        </p:spPr>
+        <p:txBody>
+          <a:bodyPr wrap="square" rtlCol="0">
+            <a:spAutoFit/>
+          </a:bodyPr>
+          <a:lstStyle/>
+          <a:p>
+            <a:r>
+              <a:rPr lang="en-US" sz="3200" b="1" dirty="0"/>
+              <a:t>HTML (home.html)</a:t>
+            </a:r>
+          </a:p>
+          <a:p>
+            <a:endParaRPr lang="en-US" dirty="0"/>
+          </a:p>
+          <a:p>
+            <a:r>
+              <a:rPr lang="en-US" dirty="0"/>
+              <a:t>&lt;</a:t>
+            </a:r>
+            <a:r>
+              <a:rPr lang="en-US" dirty="0" err="1"/>
+              <a:t>img</a:t>
+            </a:r>
+            <a:r>
+              <a:rPr lang="en-US" dirty="0"/>
+              <a:t> </a:t>
+            </a:r>
+            <a:r>
+              <a:rPr lang="en-US" dirty="0" err="1"/>
+              <a:t>src</a:t>
+            </a:r>
+            <a:r>
+              <a:rPr lang="en-US" dirty="0"/>
+              <a:t>=“image1.png”&gt;</a:t>
+            </a:r>
+          </a:p>
+          <a:p>
+            <a:r>
+              <a:rPr lang="en-US" dirty="0"/>
+              <a:t>&lt;</a:t>
+            </a:r>
+            <a:r>
+              <a:rPr lang="en-US" dirty="0" err="1"/>
+              <a:t>img</a:t>
+            </a:r>
+            <a:r>
+              <a:rPr lang="en-US" dirty="0"/>
+              <a:t> </a:t>
+            </a:r>
+            <a:r>
+              <a:rPr lang="en-US" dirty="0" err="1"/>
+              <a:t>src</a:t>
+            </a:r>
+            <a:r>
+              <a:rPr lang="en-US" dirty="0"/>
+              <a:t>=“image2.png”&gt;</a:t>
+            </a:r>
+          </a:p>
+          <a:p>
+            <a:r>
+              <a:rPr lang="en-US" dirty="0"/>
+              <a:t>&lt;</a:t>
+            </a:r>
+            <a:r>
+              <a:rPr lang="en-US" dirty="0" err="1"/>
+              <a:t>img</a:t>
+            </a:r>
+            <a:r>
+              <a:rPr lang="en-US" dirty="0"/>
+              <a:t> </a:t>
+            </a:r>
+            <a:r>
+              <a:rPr lang="en-US" dirty="0" err="1"/>
+              <a:t>src</a:t>
+            </a:r>
+            <a:r>
+              <a:rPr lang="en-US" dirty="0"/>
+              <a:t>=“image3.png”&gt;</a:t>
             </a:r>
           </a:p>
         </p:txBody>
@@ -5605,7 +6413,7 @@
     </p:spTree>
     <p:extLst>
       <p:ext uri="{BB962C8B-B14F-4D97-AF65-F5344CB8AC3E}">
-        <p14:creationId xmlns:p14="http://schemas.microsoft.com/office/powerpoint/2010/main" val="1658153941"/>
+        <p14:creationId xmlns:p14="http://schemas.microsoft.com/office/powerpoint/2010/main" val="1050613931"/>
       </p:ext>
     </p:extLst>
   </p:cSld>
@@ -5662,10 +6470,10 @@
       </p:sp>
       <p:pic>
         <p:nvPicPr>
-          <p:cNvPr id="3" name="Picture 2">
-            <a:extLst>
-              <a:ext uri="{FF2B5EF4-FFF2-40B4-BE49-F238E27FC236}">
-                <a16:creationId xmlns:a16="http://schemas.microsoft.com/office/drawing/2014/main" id="{E8A2492A-95D1-4B74-A4CC-FE5F0BA46E04}"/>
+          <p:cNvPr id="4" name="Picture 3">
+            <a:extLst>
+              <a:ext uri="{FF2B5EF4-FFF2-40B4-BE49-F238E27FC236}">
+                <a16:creationId xmlns:a16="http://schemas.microsoft.com/office/drawing/2014/main" id="{E23F4A1F-72C7-4ADF-B7C1-B1F374F8A8BB}"/>
               </a:ext>
             </a:extLst>
           </p:cNvPr>
@@ -5674,28 +6482,85 @@
           </p:cNvPicPr>
           <p:nvPr/>
         </p:nvPicPr>
-        <p:blipFill>
+        <p:blipFill rotWithShape="1">
           <a:blip r:embed="rId2"/>
-          <a:stretch>
-            <a:fillRect/>
-          </a:stretch>
+          <a:srcRect l="76266" t="18418" b="42524"/>
+          <a:stretch/>
         </p:blipFill>
         <p:spPr>
           <a:xfrm>
-            <a:off x="191057" y="1690688"/>
-            <a:ext cx="2647950" cy="2886075"/>
+            <a:off x="4528355" y="1655603"/>
+            <a:ext cx="2541865" cy="1929469"/>
           </a:xfrm>
           <a:prstGeom prst="rect">
             <a:avLst/>
           </a:prstGeom>
         </p:spPr>
       </p:pic>
-      <p:sp>
-        <p:nvSpPr>
-          <p:cNvPr id="11" name="TextBox 10">
-            <a:extLst>
-              <a:ext uri="{FF2B5EF4-FFF2-40B4-BE49-F238E27FC236}">
-                <a16:creationId xmlns:a16="http://schemas.microsoft.com/office/drawing/2014/main" id="{D7E1D2F5-BBA3-4CFA-8B02-A4CB34A9997E}"/>
+      <p:pic>
+        <p:nvPicPr>
+          <p:cNvPr id="5" name="Picture 4">
+            <a:extLst>
+              <a:ext uri="{FF2B5EF4-FFF2-40B4-BE49-F238E27FC236}">
+                <a16:creationId xmlns:a16="http://schemas.microsoft.com/office/drawing/2014/main" id="{DDF427E8-3ECF-477B-83AE-D4E4F5BDCAE4}"/>
+              </a:ext>
+            </a:extLst>
+          </p:cNvPr>
+          <p:cNvPicPr>
+            <a:picLocks noChangeAspect="1"/>
+          </p:cNvPicPr>
+          <p:nvPr/>
+        </p:nvPicPr>
+        <p:blipFill rotWithShape="1">
+          <a:blip r:embed="rId2"/>
+          <a:srcRect l="51279" t="18418" r="24987" b="42524"/>
+          <a:stretch/>
+        </p:blipFill>
+        <p:spPr>
+          <a:xfrm>
+            <a:off x="903399" y="1635848"/>
+            <a:ext cx="2541864" cy="1929469"/>
+          </a:xfrm>
+          <a:prstGeom prst="rect">
+            <a:avLst/>
+          </a:prstGeom>
+        </p:spPr>
+      </p:pic>
+      <p:pic>
+        <p:nvPicPr>
+          <p:cNvPr id="6" name="Picture 5">
+            <a:extLst>
+              <a:ext uri="{FF2B5EF4-FFF2-40B4-BE49-F238E27FC236}">
+                <a16:creationId xmlns:a16="http://schemas.microsoft.com/office/drawing/2014/main" id="{5CD7CB7C-C4B7-414C-A7C5-DC15A3CA1789}"/>
+              </a:ext>
+            </a:extLst>
+          </p:cNvPr>
+          <p:cNvPicPr>
+            <a:picLocks noChangeAspect="1"/>
+          </p:cNvPicPr>
+          <p:nvPr/>
+        </p:nvPicPr>
+        <p:blipFill rotWithShape="1">
+          <a:blip r:embed="rId2"/>
+          <a:srcRect l="76477" t="61059" r="-211" b="-117"/>
+          <a:stretch/>
+        </p:blipFill>
+        <p:spPr>
+          <a:xfrm>
+            <a:off x="8470462" y="1635849"/>
+            <a:ext cx="2541865" cy="1929469"/>
+          </a:xfrm>
+          <a:prstGeom prst="rect">
+            <a:avLst/>
+          </a:prstGeom>
+        </p:spPr>
+      </p:pic>
+      <p:sp>
+        <p:nvSpPr>
+          <p:cNvPr id="7" name="TextBox 6">
+            <a:extLst>
+              <a:ext uri="{FF2B5EF4-FFF2-40B4-BE49-F238E27FC236}">
+                <a16:creationId xmlns:a16="http://schemas.microsoft.com/office/drawing/2014/main" id="{50CE2AEF-362D-4DFF-9366-F8EC0BB736B7}"/>
               </a:ext>
             </a:extLst>
           </p:cNvPr>
@@ -5704,159 +6569,33 @@
         </p:nvSpPr>
         <p:spPr>
           <a:xfrm>
-            <a:off x="2889216" y="1436520"/>
-            <a:ext cx="5438273" cy="3908762"/>
+            <a:off x="1820254" y="3931065"/>
+            <a:ext cx="1097929" cy="369332"/>
           </a:xfrm>
           <a:prstGeom prst="rect">
             <a:avLst/>
           </a:prstGeom>
           <a:noFill/>
-          <a:ln w="57150">
-            <a:solidFill>
-              <a:schemeClr val="tx1"/>
-            </a:solidFill>
-          </a:ln>
         </p:spPr>
         <p:txBody>
-          <a:bodyPr wrap="square" rtlCol="0">
+          <a:bodyPr wrap="none" rtlCol="0">
             <a:spAutoFit/>
           </a:bodyPr>
           <a:lstStyle/>
           <a:p>
             <a:r>
-              <a:rPr lang="en-US" sz="3200" b="1" dirty="0"/>
-              <a:t>HTML (home.html)</a:t>
-            </a:r>
-            <a:endParaRPr lang="en-US" b="1" dirty="0"/>
-          </a:p>
-          <a:p>
-            <a:r>
               <a:rPr lang="en-US" dirty="0"/>
-              <a:t>&lt;link </a:t>
-            </a:r>
-            <a:r>
-              <a:rPr lang="en-US" dirty="0" err="1"/>
-              <a:t>rel</a:t>
-            </a:r>
-            <a:r>
-              <a:rPr lang="en-US" dirty="0"/>
-              <a:t>="stylesheet" </a:t>
-            </a:r>
-            <a:r>
-              <a:rPr lang="en-US" dirty="0" err="1"/>
-              <a:t>href</a:t>
-            </a:r>
-            <a:r>
-              <a:rPr lang="en-US" dirty="0"/>
-              <a:t>="assets/styles.css"&gt;</a:t>
-            </a:r>
-          </a:p>
-          <a:p>
-            <a:r>
-              <a:rPr lang="en-US" dirty="0"/>
-              <a:t>&lt;div id=“</a:t>
-            </a:r>
-            <a:r>
-              <a:rPr lang="en-US" dirty="0" err="1"/>
-              <a:t>itemContainer</a:t>
-            </a:r>
-            <a:r>
-              <a:rPr lang="en-US" dirty="0"/>
-              <a:t>”&gt;</a:t>
-            </a:r>
-          </a:p>
-          <a:p>
-            <a:r>
-              <a:rPr lang="en-US" dirty="0"/>
-              <a:t>    &lt;div id=“sale”&gt;</a:t>
-            </a:r>
-          </a:p>
-          <a:p>
-            <a:r>
-              <a:rPr lang="en-US" dirty="0"/>
-              <a:t>        SALE!</a:t>
-            </a:r>
-          </a:p>
-          <a:p>
-            <a:r>
-              <a:rPr lang="en-US" dirty="0"/>
-              <a:t>    &lt;/div&gt;</a:t>
-            </a:r>
-          </a:p>
-          <a:p>
-            <a:r>
-              <a:rPr lang="en-US" dirty="0"/>
-              <a:t>    &lt;</a:t>
-            </a:r>
-            <a:r>
-              <a:rPr lang="en-US" dirty="0" err="1"/>
-              <a:t>img</a:t>
-            </a:r>
-            <a:r>
-              <a:rPr lang="en-US" dirty="0"/>
-              <a:t> id=“</a:t>
-            </a:r>
-            <a:r>
-              <a:rPr lang="en-US" dirty="0" err="1"/>
-              <a:t>itemImage</a:t>
-            </a:r>
-            <a:r>
-              <a:rPr lang="en-US" dirty="0"/>
-              <a:t>” </a:t>
-            </a:r>
-            <a:r>
-              <a:rPr lang="en-US" dirty="0" err="1"/>
-              <a:t>src</a:t>
-            </a:r>
-            <a:r>
-              <a:rPr lang="en-US" dirty="0"/>
-              <a:t>=“assets/orange-pants.png”&gt;</a:t>
-            </a:r>
-          </a:p>
-          <a:p>
-            <a:r>
-              <a:rPr lang="en-US" dirty="0"/>
-              <a:t>    &lt;button&gt;</a:t>
-            </a:r>
-          </a:p>
-          <a:p>
-            <a:r>
-              <a:rPr lang="en-US" dirty="0"/>
-              <a:t>        &lt;b&gt;</a:t>
-            </a:r>
-          </a:p>
-          <a:p>
-            <a:r>
-              <a:rPr lang="en-US" dirty="0"/>
-              <a:t>            $10.99</a:t>
-            </a:r>
-          </a:p>
-          <a:p>
-            <a:r>
-              <a:rPr lang="en-US" dirty="0"/>
-              <a:t>        &lt;/b&gt;</a:t>
-            </a:r>
-          </a:p>
-          <a:p>
-            <a:r>
-              <a:rPr lang="en-US" dirty="0"/>
-              <a:t>    &lt;/button&gt;</a:t>
-            </a:r>
-          </a:p>
-          <a:p>
-            <a:r>
-              <a:rPr lang="en-US" dirty="0"/>
-              <a:t>&lt;/div&gt;</a:t>
-            </a:r>
-          </a:p>
-        </p:txBody>
-      </p:sp>
-      <p:sp>
-        <p:nvSpPr>
-          <p:cNvPr id="12" name="TextBox 11">
-            <a:extLst>
-              <a:ext uri="{FF2B5EF4-FFF2-40B4-BE49-F238E27FC236}">
-                <a16:creationId xmlns:a16="http://schemas.microsoft.com/office/drawing/2014/main" id="{AB959D7F-C601-4625-9D2B-9F9FB79D83F4}"/>
+              <a:t>New Item</a:t>
+            </a:r>
+          </a:p>
+        </p:txBody>
+      </p:sp>
+      <p:sp>
+        <p:nvSpPr>
+          <p:cNvPr id="8" name="TextBox 7">
+            <a:extLst>
+              <a:ext uri="{FF2B5EF4-FFF2-40B4-BE49-F238E27FC236}">
+                <a16:creationId xmlns:a16="http://schemas.microsoft.com/office/drawing/2014/main" id="{21A695D7-6EAD-4C5D-A3DF-E01ED82AA17E}"/>
               </a:ext>
             </a:extLst>
           </p:cNvPr>
@@ -5865,245 +6604,58 @@
         </p:nvSpPr>
         <p:spPr>
           <a:xfrm>
-            <a:off x="8439324" y="181957"/>
-            <a:ext cx="3674379" cy="6494085"/>
+            <a:off x="5272187" y="3932927"/>
+            <a:ext cx="1054199" cy="369332"/>
           </a:xfrm>
           <a:prstGeom prst="rect">
             <a:avLst/>
           </a:prstGeom>
           <a:noFill/>
-          <a:ln w="57150">
-            <a:solidFill>
-              <a:schemeClr val="tx1"/>
-            </a:solidFill>
-          </a:ln>
         </p:spPr>
         <p:txBody>
-          <a:bodyPr wrap="square" rtlCol="0">
+          <a:bodyPr wrap="none" rtlCol="0">
             <a:spAutoFit/>
           </a:bodyPr>
           <a:lstStyle/>
           <a:p>
             <a:r>
-              <a:rPr lang="en-US" sz="2400" b="1" dirty="0"/>
-              <a:t>CSS (styles.css)</a:t>
-            </a:r>
-            <a:endParaRPr lang="en-US" sz="1400" b="1" dirty="0"/>
-          </a:p>
-          <a:p>
-            <a:r>
-              <a:rPr lang="en-US" sz="1400" dirty="0"/>
-              <a:t>#</a:t>
-            </a:r>
-            <a:r>
-              <a:rPr lang="en-US" sz="1400" dirty="0" err="1"/>
-              <a:t>itemContainer</a:t>
-            </a:r>
-            <a:r>
-              <a:rPr lang="en-US" sz="1400" dirty="0"/>
-              <a:t>{</a:t>
-            </a:r>
-          </a:p>
-          <a:p>
-            <a:r>
-              <a:rPr lang="en-US" sz="1400" dirty="0"/>
-              <a:t>    border: 4px solid </a:t>
-            </a:r>
-            <a:r>
-              <a:rPr lang="en-US" sz="1400" dirty="0" err="1"/>
-              <a:t>darkslategray</a:t>
-            </a:r>
-            <a:r>
-              <a:rPr lang="en-US" sz="1400" dirty="0"/>
-              <a:t>;</a:t>
-            </a:r>
-          </a:p>
-          <a:p>
-            <a:r>
-              <a:rPr lang="en-US" sz="1400" dirty="0"/>
-              <a:t>    background-color: </a:t>
-            </a:r>
-            <a:r>
-              <a:rPr lang="en-US" sz="1400" dirty="0" err="1"/>
-              <a:t>slategrey</a:t>
-            </a:r>
-            <a:r>
-              <a:rPr lang="en-US" sz="1400" dirty="0"/>
-              <a:t>;</a:t>
-            </a:r>
-          </a:p>
-          <a:p>
-            <a:r>
-              <a:rPr lang="en-US" sz="1400" dirty="0"/>
-              <a:t>    height: 30%;</a:t>
-            </a:r>
-          </a:p>
-          <a:p>
-            <a:r>
-              <a:rPr lang="en-US" sz="1400" dirty="0"/>
-              <a:t>    width: 20%;</a:t>
-            </a:r>
-          </a:p>
-          <a:p>
-            <a:r>
-              <a:rPr lang="en-US" sz="1400" dirty="0"/>
-              <a:t>    float: left;</a:t>
-            </a:r>
-          </a:p>
-          <a:p>
-            <a:r>
-              <a:rPr lang="en-US" sz="1400" dirty="0"/>
-              <a:t>    display: flex;</a:t>
-            </a:r>
-          </a:p>
-          <a:p>
-            <a:r>
-              <a:rPr lang="en-US" sz="1400" dirty="0"/>
-              <a:t>    margin: 1%;</a:t>
-            </a:r>
-          </a:p>
-          <a:p>
-            <a:r>
-              <a:rPr lang="en-US" sz="1400" dirty="0"/>
-              <a:t>    align-items: center;</a:t>
-            </a:r>
-          </a:p>
-          <a:p>
-            <a:r>
-              <a:rPr lang="en-US" sz="1400" dirty="0"/>
-              <a:t>    justify-content: center;</a:t>
-            </a:r>
-          </a:p>
-          <a:p>
-            <a:r>
-              <a:rPr lang="en-US" sz="1400" dirty="0"/>
-              <a:t>}</a:t>
-            </a:r>
-          </a:p>
-          <a:p>
-            <a:r>
-              <a:rPr lang="en-US" sz="1400" dirty="0"/>
-              <a:t>#</a:t>
-            </a:r>
-            <a:r>
-              <a:rPr lang="en-US" sz="1400" dirty="0" err="1"/>
-              <a:t>itemContainer:hover</a:t>
-            </a:r>
-            <a:r>
-              <a:rPr lang="en-US" sz="1400" dirty="0"/>
-              <a:t>{ background-color: gold;}</a:t>
-            </a:r>
-          </a:p>
-          <a:p>
-            <a:r>
-              <a:rPr lang="en-US" sz="1400" dirty="0"/>
-              <a:t>#</a:t>
-            </a:r>
-            <a:r>
-              <a:rPr lang="en-US" sz="1400" dirty="0" err="1"/>
-              <a:t>itemImage</a:t>
-            </a:r>
-            <a:r>
-              <a:rPr lang="en-US" sz="1400" dirty="0"/>
-              <a:t> {</a:t>
-            </a:r>
-          </a:p>
-          <a:p>
-            <a:r>
-              <a:rPr lang="en-US" sz="1400" dirty="0"/>
-              <a:t>    width: 80%;</a:t>
-            </a:r>
-          </a:p>
-          <a:p>
-            <a:r>
-              <a:rPr lang="en-US" sz="1400" dirty="0"/>
-              <a:t>    height: 50%;</a:t>
-            </a:r>
-          </a:p>
-          <a:p>
-            <a:r>
-              <a:rPr lang="en-US" sz="1400" dirty="0"/>
-              <a:t>    padding-top: 5%;</a:t>
-            </a:r>
-          </a:p>
-          <a:p>
-            <a:r>
-              <a:rPr lang="en-US" sz="1400" dirty="0"/>
-              <a:t>    margin-left: auto;</a:t>
-            </a:r>
-          </a:p>
-          <a:p>
-            <a:r>
-              <a:rPr lang="en-US" sz="1400" dirty="0"/>
-              <a:t>    margin-right: auto;</a:t>
-            </a:r>
-          </a:p>
-          <a:p>
-            <a:r>
-              <a:rPr lang="en-US" sz="1400" dirty="0"/>
-              <a:t>}</a:t>
-            </a:r>
-          </a:p>
-          <a:p>
-            <a:r>
-              <a:rPr lang="en-US" sz="1400" dirty="0"/>
-              <a:t>#sale {</a:t>
-            </a:r>
-          </a:p>
-          <a:p>
-            <a:r>
-              <a:rPr lang="en-US" sz="1400" dirty="0"/>
-              <a:t>    border-left: 8px solid </a:t>
-            </a:r>
-            <a:r>
-              <a:rPr lang="en-US" sz="1400" dirty="0" err="1"/>
-              <a:t>darkorange</a:t>
-            </a:r>
-            <a:r>
-              <a:rPr lang="en-US" sz="1400" dirty="0"/>
-              <a:t>;</a:t>
-            </a:r>
-          </a:p>
-          <a:p>
-            <a:r>
-              <a:rPr lang="en-US" sz="1400" dirty="0"/>
-              <a:t>    color: coral;</a:t>
-            </a:r>
-          </a:p>
-          <a:p>
-            <a:r>
-              <a:rPr lang="en-US" sz="1400" dirty="0"/>
-              <a:t>    float: right;</a:t>
-            </a:r>
-          </a:p>
-          <a:p>
-            <a:r>
-              <a:rPr lang="en-US" sz="1400" dirty="0"/>
-              <a:t>    font-weight: bold;</a:t>
-            </a:r>
-          </a:p>
-          <a:p>
-            <a:r>
-              <a:rPr lang="en-US" sz="1400" dirty="0"/>
-              <a:t>    font-size: xx-large;</a:t>
-            </a:r>
-          </a:p>
-          <a:p>
-            <a:r>
-              <a:rPr lang="en-US" sz="1400" dirty="0"/>
-              <a:t>    background-color: red;</a:t>
-            </a:r>
-          </a:p>
-          <a:p>
-            <a:r>
-              <a:rPr lang="en-US" sz="1400" dirty="0"/>
-              <a:t>    cursor: default;</a:t>
-            </a:r>
-          </a:p>
-          <a:p>
-            <a:r>
-              <a:rPr lang="en-US" sz="1400" dirty="0"/>
-              <a:t>}</a:t>
+              <a:rPr lang="en-US" dirty="0"/>
+              <a:t>Sale Item</a:t>
+            </a:r>
+          </a:p>
+        </p:txBody>
+      </p:sp>
+      <p:sp>
+        <p:nvSpPr>
+          <p:cNvPr id="9" name="TextBox 8">
+            <a:extLst>
+              <a:ext uri="{FF2B5EF4-FFF2-40B4-BE49-F238E27FC236}">
+                <a16:creationId xmlns:a16="http://schemas.microsoft.com/office/drawing/2014/main" id="{FBD2A4C8-FCA3-4F56-8014-E19C0D93F4D5}"/>
+              </a:ext>
+            </a:extLst>
+          </p:cNvPr>
+          <p:cNvSpPr txBox="1"/>
+          <p:nvPr/>
+        </p:nvSpPr>
+        <p:spPr>
+          <a:xfrm>
+            <a:off x="8991368" y="3862699"/>
+            <a:ext cx="1380378" cy="369332"/>
+          </a:xfrm>
+          <a:prstGeom prst="rect">
+            <a:avLst/>
+          </a:prstGeom>
+          <a:noFill/>
+        </p:spPr>
+        <p:txBody>
+          <a:bodyPr wrap="none" rtlCol="0">
+            <a:spAutoFit/>
+          </a:bodyPr>
+          <a:lstStyle/>
+          <a:p>
+            <a:r>
+              <a:rPr lang="en-US" dirty="0"/>
+              <a:t>Regular Item</a:t>
             </a:r>
           </a:p>
         </p:txBody>
@@ -6111,7 +6663,7 @@
     </p:spTree>
     <p:extLst>
       <p:ext uri="{BB962C8B-B14F-4D97-AF65-F5344CB8AC3E}">
-        <p14:creationId xmlns:p14="http://schemas.microsoft.com/office/powerpoint/2010/main" val="1399610798"/>
+        <p14:creationId xmlns:p14="http://schemas.microsoft.com/office/powerpoint/2010/main" val="1658153941"/>
       </p:ext>
     </p:extLst>
   </p:cSld>
@@ -6161,42 +6713,17 @@
           <a:p>
             <a:r>
               <a:rPr lang="en-US" dirty="0"/>
-              <a:t>Day 3: Create The “All Items” Display </a:t>
-            </a:r>
-          </a:p>
-        </p:txBody>
-      </p:sp>
-      <p:sp>
-        <p:nvSpPr>
-          <p:cNvPr id="3" name="Content Placeholder 2">
-            <a:extLst>
-              <a:ext uri="{FF2B5EF4-FFF2-40B4-BE49-F238E27FC236}">
-                <a16:creationId xmlns:a16="http://schemas.microsoft.com/office/drawing/2014/main" id="{FB9B7DBA-03F3-41D9-A134-6BE6890B33D9}"/>
-              </a:ext>
-            </a:extLst>
-          </p:cNvPr>
-          <p:cNvSpPr>
-            <a:spLocks noGrp="1"/>
-          </p:cNvSpPr>
-          <p:nvPr>
-            <p:ph idx="1"/>
-          </p:nvPr>
-        </p:nvSpPr>
-        <p:spPr/>
-        <p:txBody>
-          <a:bodyPr/>
-          <a:lstStyle/>
-          <a:p>
-            <a:endParaRPr lang="en-US"/>
+              <a:t>Day 2: Create An Item Container</a:t>
+            </a:r>
           </a:p>
         </p:txBody>
       </p:sp>
       <p:pic>
         <p:nvPicPr>
-          <p:cNvPr id="4" name="Picture 3">
-            <a:extLst>
-              <a:ext uri="{FF2B5EF4-FFF2-40B4-BE49-F238E27FC236}">
-                <a16:creationId xmlns:a16="http://schemas.microsoft.com/office/drawing/2014/main" id="{E23F4A1F-72C7-4ADF-B7C1-B1F374F8A8BB}"/>
+          <p:cNvPr id="3" name="Picture 2">
+            <a:extLst>
+              <a:ext uri="{FF2B5EF4-FFF2-40B4-BE49-F238E27FC236}">
+                <a16:creationId xmlns:a16="http://schemas.microsoft.com/office/drawing/2014/main" id="{E8A2492A-95D1-4B74-A4CC-FE5F0BA46E04}"/>
               </a:ext>
             </a:extLst>
           </p:cNvPr>
@@ -6205,15 +6732,16 @@
           </p:cNvPicPr>
           <p:nvPr/>
         </p:nvPicPr>
-        <p:blipFill rotWithShape="1">
+        <p:blipFill>
           <a:blip r:embed="rId2"/>
-          <a:srcRect l="908" t="17327"/>
-          <a:stretch/>
+          <a:stretch>
+            <a:fillRect/>
+          </a:stretch>
         </p:blipFill>
         <p:spPr>
           <a:xfrm>
-            <a:off x="741028" y="1386927"/>
-            <a:ext cx="10612772" cy="4084145"/>
+            <a:off x="191057" y="1690688"/>
+            <a:ext cx="2647950" cy="2886075"/>
           </a:xfrm>
           <a:prstGeom prst="rect">
             <a:avLst/>
@@ -6222,10 +6750,10 @@
       </p:pic>
       <p:sp>
         <p:nvSpPr>
-          <p:cNvPr id="5" name="TextBox 4">
-            <a:extLst>
-              <a:ext uri="{FF2B5EF4-FFF2-40B4-BE49-F238E27FC236}">
-                <a16:creationId xmlns:a16="http://schemas.microsoft.com/office/drawing/2014/main" id="{9F7EFD01-8D37-4227-95CA-3997D6C3E833}"/>
+          <p:cNvPr id="11" name="TextBox 10">
+            <a:extLst>
+              <a:ext uri="{FF2B5EF4-FFF2-40B4-BE49-F238E27FC236}">
+                <a16:creationId xmlns:a16="http://schemas.microsoft.com/office/drawing/2014/main" id="{D7E1D2F5-BBA3-4CFA-8B02-A4CB34A9997E}"/>
               </a:ext>
             </a:extLst>
           </p:cNvPr>
@@ -6234,23 +6762,406 @@
         </p:nvSpPr>
         <p:spPr>
           <a:xfrm>
-            <a:off x="2607179" y="5639351"/>
-            <a:ext cx="6051593" cy="369332"/>
+            <a:off x="2889216" y="1436520"/>
+            <a:ext cx="5438273" cy="3908762"/>
           </a:xfrm>
           <a:prstGeom prst="rect">
             <a:avLst/>
           </a:prstGeom>
           <a:noFill/>
+          <a:ln w="57150">
+            <a:solidFill>
+              <a:schemeClr val="tx1"/>
+            </a:solidFill>
+          </a:ln>
         </p:spPr>
         <p:txBody>
-          <a:bodyPr wrap="none" rtlCol="0">
+          <a:bodyPr wrap="square" rtlCol="0">
             <a:spAutoFit/>
           </a:bodyPr>
           <a:lstStyle/>
           <a:p>
             <a:r>
+              <a:rPr lang="en-US" sz="3200" b="1" dirty="0"/>
+              <a:t>HTML (home.html)</a:t>
+            </a:r>
+            <a:endParaRPr lang="en-US" b="1" dirty="0"/>
+          </a:p>
+          <a:p>
+            <a:r>
               <a:rPr lang="en-US" dirty="0"/>
-              <a:t>Combine New, Sale, and Regular Items in an organized manner</a:t>
+              <a:t>&lt;link </a:t>
+            </a:r>
+            <a:r>
+              <a:rPr lang="en-US" dirty="0" err="1"/>
+              <a:t>rel</a:t>
+            </a:r>
+            <a:r>
+              <a:rPr lang="en-US" dirty="0"/>
+              <a:t>="stylesheet" </a:t>
+            </a:r>
+            <a:r>
+              <a:rPr lang="en-US" dirty="0" err="1"/>
+              <a:t>href</a:t>
+            </a:r>
+            <a:r>
+              <a:rPr lang="en-US" dirty="0"/>
+              <a:t>="styles.css"&gt;</a:t>
+            </a:r>
+          </a:p>
+          <a:p>
+            <a:r>
+              <a:rPr lang="en-US" dirty="0"/>
+              <a:t>&lt;div id=“</a:t>
+            </a:r>
+            <a:r>
+              <a:rPr lang="en-US" dirty="0" err="1"/>
+              <a:t>itemContainer</a:t>
+            </a:r>
+            <a:r>
+              <a:rPr lang="en-US" dirty="0"/>
+              <a:t>”&gt;</a:t>
+            </a:r>
+          </a:p>
+          <a:p>
+            <a:r>
+              <a:rPr lang="en-US" dirty="0"/>
+              <a:t>    &lt;div id=“sale”&gt;</a:t>
+            </a:r>
+          </a:p>
+          <a:p>
+            <a:r>
+              <a:rPr lang="en-US" dirty="0"/>
+              <a:t>        SALE!</a:t>
+            </a:r>
+          </a:p>
+          <a:p>
+            <a:r>
+              <a:rPr lang="en-US" dirty="0"/>
+              <a:t>    &lt;/div&gt;</a:t>
+            </a:r>
+          </a:p>
+          <a:p>
+            <a:r>
+              <a:rPr lang="en-US" dirty="0"/>
+              <a:t>    &lt;</a:t>
+            </a:r>
+            <a:r>
+              <a:rPr lang="en-US" dirty="0" err="1"/>
+              <a:t>img</a:t>
+            </a:r>
+            <a:r>
+              <a:rPr lang="en-US" dirty="0"/>
+              <a:t> id=“</a:t>
+            </a:r>
+            <a:r>
+              <a:rPr lang="en-US" dirty="0" err="1"/>
+              <a:t>itemImage</a:t>
+            </a:r>
+            <a:r>
+              <a:rPr lang="en-US" dirty="0"/>
+              <a:t>” </a:t>
+            </a:r>
+            <a:r>
+              <a:rPr lang="en-US" dirty="0" err="1"/>
+              <a:t>src</a:t>
+            </a:r>
+            <a:r>
+              <a:rPr lang="en-US" dirty="0"/>
+              <a:t>=“orange-pants.png”&gt;</a:t>
+            </a:r>
+          </a:p>
+          <a:p>
+            <a:r>
+              <a:rPr lang="en-US" dirty="0"/>
+              <a:t>    &lt;button&gt;</a:t>
+            </a:r>
+          </a:p>
+          <a:p>
+            <a:r>
+              <a:rPr lang="en-US" dirty="0"/>
+              <a:t>        &lt;b&gt;</a:t>
+            </a:r>
+          </a:p>
+          <a:p>
+            <a:r>
+              <a:rPr lang="en-US" dirty="0"/>
+              <a:t>            $10.99</a:t>
+            </a:r>
+          </a:p>
+          <a:p>
+            <a:r>
+              <a:rPr lang="en-US" dirty="0"/>
+              <a:t>        &lt;/b&gt;</a:t>
+            </a:r>
+          </a:p>
+          <a:p>
+            <a:r>
+              <a:rPr lang="en-US" dirty="0"/>
+              <a:t>    &lt;/button&gt;</a:t>
+            </a:r>
+          </a:p>
+          <a:p>
+            <a:r>
+              <a:rPr lang="en-US" dirty="0"/>
+              <a:t>&lt;/div&gt;</a:t>
+            </a:r>
+          </a:p>
+        </p:txBody>
+      </p:sp>
+      <p:sp>
+        <p:nvSpPr>
+          <p:cNvPr id="12" name="TextBox 11">
+            <a:extLst>
+              <a:ext uri="{FF2B5EF4-FFF2-40B4-BE49-F238E27FC236}">
+                <a16:creationId xmlns:a16="http://schemas.microsoft.com/office/drawing/2014/main" id="{AB959D7F-C601-4625-9D2B-9F9FB79D83F4}"/>
+              </a:ext>
+            </a:extLst>
+          </p:cNvPr>
+          <p:cNvSpPr txBox="1"/>
+          <p:nvPr/>
+        </p:nvSpPr>
+        <p:spPr>
+          <a:xfrm>
+            <a:off x="8439324" y="181957"/>
+            <a:ext cx="3674379" cy="6494085"/>
+          </a:xfrm>
+          <a:prstGeom prst="rect">
+            <a:avLst/>
+          </a:prstGeom>
+          <a:noFill/>
+          <a:ln w="57150">
+            <a:solidFill>
+              <a:schemeClr val="tx1"/>
+            </a:solidFill>
+          </a:ln>
+        </p:spPr>
+        <p:txBody>
+          <a:bodyPr wrap="square" rtlCol="0">
+            <a:spAutoFit/>
+          </a:bodyPr>
+          <a:lstStyle/>
+          <a:p>
+            <a:r>
+              <a:rPr lang="en-US" sz="2400" b="1" dirty="0"/>
+              <a:t>CSS (styles.css)</a:t>
+            </a:r>
+            <a:endParaRPr lang="en-US" sz="1400" b="1" dirty="0"/>
+          </a:p>
+          <a:p>
+            <a:r>
+              <a:rPr lang="en-US" sz="1400" dirty="0"/>
+              <a:t>#</a:t>
+            </a:r>
+            <a:r>
+              <a:rPr lang="en-US" sz="1400" dirty="0" err="1"/>
+              <a:t>itemContainer</a:t>
+            </a:r>
+            <a:r>
+              <a:rPr lang="en-US" sz="1400" dirty="0"/>
+              <a:t>{</a:t>
+            </a:r>
+          </a:p>
+          <a:p>
+            <a:r>
+              <a:rPr lang="en-US" sz="1400" dirty="0"/>
+              <a:t>    border: 4px solid </a:t>
+            </a:r>
+            <a:r>
+              <a:rPr lang="en-US" sz="1400" dirty="0" err="1"/>
+              <a:t>darkslategray</a:t>
+            </a:r>
+            <a:r>
+              <a:rPr lang="en-US" sz="1400" dirty="0"/>
+              <a:t>;</a:t>
+            </a:r>
+          </a:p>
+          <a:p>
+            <a:r>
+              <a:rPr lang="en-US" sz="1400" dirty="0"/>
+              <a:t>    background-color: </a:t>
+            </a:r>
+            <a:r>
+              <a:rPr lang="en-US" sz="1400" dirty="0" err="1"/>
+              <a:t>slategrey</a:t>
+            </a:r>
+            <a:r>
+              <a:rPr lang="en-US" sz="1400" dirty="0"/>
+              <a:t>;</a:t>
+            </a:r>
+          </a:p>
+          <a:p>
+            <a:r>
+              <a:rPr lang="en-US" sz="1400" dirty="0"/>
+              <a:t>    height: 30%;</a:t>
+            </a:r>
+          </a:p>
+          <a:p>
+            <a:r>
+              <a:rPr lang="en-US" sz="1400" dirty="0"/>
+              <a:t>    width: 20%;</a:t>
+            </a:r>
+          </a:p>
+          <a:p>
+            <a:r>
+              <a:rPr lang="en-US" sz="1400" dirty="0"/>
+              <a:t>    float: left;</a:t>
+            </a:r>
+          </a:p>
+          <a:p>
+            <a:r>
+              <a:rPr lang="en-US" sz="1400" dirty="0"/>
+              <a:t>    display: flex;</a:t>
+            </a:r>
+          </a:p>
+          <a:p>
+            <a:r>
+              <a:rPr lang="en-US" sz="1400" dirty="0"/>
+              <a:t>    margin: 1%;</a:t>
+            </a:r>
+          </a:p>
+          <a:p>
+            <a:r>
+              <a:rPr lang="en-US" sz="1400" dirty="0"/>
+              <a:t>    align-items: center;</a:t>
+            </a:r>
+          </a:p>
+          <a:p>
+            <a:r>
+              <a:rPr lang="en-US" sz="1400" dirty="0"/>
+              <a:t>    justify-content: center;</a:t>
+            </a:r>
+          </a:p>
+          <a:p>
+            <a:r>
+              <a:rPr lang="en-US" sz="1400" dirty="0"/>
+              <a:t>}</a:t>
+            </a:r>
+          </a:p>
+          <a:p>
+            <a:r>
+              <a:rPr lang="en-US" sz="1400" dirty="0"/>
+              <a:t>#</a:t>
+            </a:r>
+            <a:r>
+              <a:rPr lang="en-US" sz="1400" dirty="0" err="1"/>
+              <a:t>itemContainer:hover</a:t>
+            </a:r>
+            <a:r>
+              <a:rPr lang="en-US" sz="1400" dirty="0"/>
+              <a:t>{ background-color: gold;}</a:t>
+            </a:r>
+          </a:p>
+          <a:p>
+            <a:r>
+              <a:rPr lang="en-US" sz="1400" dirty="0"/>
+              <a:t>#</a:t>
+            </a:r>
+            <a:r>
+              <a:rPr lang="en-US" sz="1400" dirty="0" err="1"/>
+              <a:t>itemImage</a:t>
+            </a:r>
+            <a:r>
+              <a:rPr lang="en-US" sz="1400" dirty="0"/>
+              <a:t> {</a:t>
+            </a:r>
+          </a:p>
+          <a:p>
+            <a:r>
+              <a:rPr lang="en-US" sz="1400" dirty="0"/>
+              <a:t>    width: 80%;</a:t>
+            </a:r>
+          </a:p>
+          <a:p>
+            <a:r>
+              <a:rPr lang="en-US" sz="1400" dirty="0"/>
+              <a:t>    height: 50%;</a:t>
+            </a:r>
+          </a:p>
+          <a:p>
+            <a:r>
+              <a:rPr lang="en-US" sz="1400" dirty="0"/>
+              <a:t>    padding-top: 5%;</a:t>
+            </a:r>
+          </a:p>
+          <a:p>
+            <a:r>
+              <a:rPr lang="en-US" sz="1400" dirty="0"/>
+              <a:t>    margin-left: auto;</a:t>
+            </a:r>
+          </a:p>
+          <a:p>
+            <a:r>
+              <a:rPr lang="en-US" sz="1400" dirty="0"/>
+              <a:t>    margin-right: auto;</a:t>
+            </a:r>
+          </a:p>
+          <a:p>
+            <a:r>
+              <a:rPr lang="en-US" sz="1400" dirty="0"/>
+              <a:t>}</a:t>
+            </a:r>
+          </a:p>
+          <a:p>
+            <a:r>
+              <a:rPr lang="en-US" sz="1400" dirty="0"/>
+              <a:t>#sale {</a:t>
+            </a:r>
+          </a:p>
+          <a:p>
+            <a:r>
+              <a:rPr lang="en-US" sz="1400" dirty="0"/>
+              <a:t>    border-left: 8px solid </a:t>
+            </a:r>
+            <a:r>
+              <a:rPr lang="en-US" sz="1400" dirty="0" err="1"/>
+              <a:t>darkorange</a:t>
+            </a:r>
+            <a:r>
+              <a:rPr lang="en-US" sz="1400" dirty="0"/>
+              <a:t>;</a:t>
+            </a:r>
+          </a:p>
+          <a:p>
+            <a:r>
+              <a:rPr lang="en-US" sz="1400" dirty="0"/>
+              <a:t>    color: coral;</a:t>
+            </a:r>
+          </a:p>
+          <a:p>
+            <a:r>
+              <a:rPr lang="en-US" sz="1400" dirty="0"/>
+              <a:t>    float: right;</a:t>
+            </a:r>
+          </a:p>
+          <a:p>
+            <a:r>
+              <a:rPr lang="en-US" sz="1400" dirty="0"/>
+              <a:t>    font-weight: bold;</a:t>
+            </a:r>
+          </a:p>
+          <a:p>
+            <a:r>
+              <a:rPr lang="en-US" sz="1400" dirty="0"/>
+              <a:t>    font-size: xx-large;</a:t>
+            </a:r>
+          </a:p>
+          <a:p>
+            <a:r>
+              <a:rPr lang="en-US" sz="1400" dirty="0"/>
+              <a:t>    background-color: red;</a:t>
+            </a:r>
+          </a:p>
+          <a:p>
+            <a:r>
+              <a:rPr lang="en-US" sz="1400" dirty="0"/>
+              <a:t>    cursor: default;</a:t>
+            </a:r>
+          </a:p>
+          <a:p>
+            <a:r>
+              <a:rPr lang="en-US" sz="1400" dirty="0"/>
+              <a:t>}</a:t>
             </a:r>
           </a:p>
         </p:txBody>
@@ -6258,7 +7169,7 @@
     </p:spTree>
     <p:extLst>
       <p:ext uri="{BB962C8B-B14F-4D97-AF65-F5344CB8AC3E}">
-        <p14:creationId xmlns:p14="http://schemas.microsoft.com/office/powerpoint/2010/main" val="1545583649"/>
+        <p14:creationId xmlns:p14="http://schemas.microsoft.com/office/powerpoint/2010/main" val="1399610798"/>
       </p:ext>
     </p:extLst>
   </p:cSld>
@@ -6301,12 +7212,7 @@
             <p:ph type="title"/>
           </p:nvPr>
         </p:nvSpPr>
-        <p:spPr>
-          <a:xfrm>
-            <a:off x="-47590" y="-2969"/>
-            <a:ext cx="10515600" cy="1325563"/>
-          </a:xfrm>
-        </p:spPr>
+        <p:spPr/>
         <p:txBody>
           <a:bodyPr/>
           <a:lstStyle/>
@@ -6315,6 +7221,31 @@
               <a:rPr lang="en-US" dirty="0"/>
               <a:t>Day 3: Create The “All Items” Display </a:t>
             </a:r>
+          </a:p>
+        </p:txBody>
+      </p:sp>
+      <p:sp>
+        <p:nvSpPr>
+          <p:cNvPr id="3" name="Content Placeholder 2">
+            <a:extLst>
+              <a:ext uri="{FF2B5EF4-FFF2-40B4-BE49-F238E27FC236}">
+                <a16:creationId xmlns:a16="http://schemas.microsoft.com/office/drawing/2014/main" id="{FB9B7DBA-03F3-41D9-A134-6BE6890B33D9}"/>
+              </a:ext>
+            </a:extLst>
+          </p:cNvPr>
+          <p:cNvSpPr>
+            <a:spLocks noGrp="1"/>
+          </p:cNvSpPr>
+          <p:nvPr>
+            <p:ph idx="1"/>
+          </p:nvPr>
+        </p:nvSpPr>
+        <p:spPr/>
+        <p:txBody>
+          <a:bodyPr/>
+          <a:lstStyle/>
+          <a:p>
+            <a:endParaRPr lang="en-US"/>
           </a:p>
         </p:txBody>
       </p:sp>
@@ -6339,8 +7270,8 @@
         </p:blipFill>
         <p:spPr>
           <a:xfrm>
-            <a:off x="178966" y="1386927"/>
-            <a:ext cx="5634605" cy="4084145"/>
+            <a:off x="741028" y="1386927"/>
+            <a:ext cx="10612772" cy="4084145"/>
           </a:xfrm>
           <a:prstGeom prst="rect">
             <a:avLst/>
@@ -6349,10 +7280,10 @@
       </p:pic>
       <p:sp>
         <p:nvSpPr>
-          <p:cNvPr id="7" name="TextBox 6">
-            <a:extLst>
-              <a:ext uri="{FF2B5EF4-FFF2-40B4-BE49-F238E27FC236}">
-                <a16:creationId xmlns:a16="http://schemas.microsoft.com/office/drawing/2014/main" id="{C921E6A5-0A7D-4457-8B3D-4244D3F6CE73}"/>
+          <p:cNvPr id="5" name="TextBox 4">
+            <a:extLst>
+              <a:ext uri="{FF2B5EF4-FFF2-40B4-BE49-F238E27FC236}">
+                <a16:creationId xmlns:a16="http://schemas.microsoft.com/office/drawing/2014/main" id="{9F7EFD01-8D37-4227-95CA-3997D6C3E833}"/>
               </a:ext>
             </a:extLst>
           </p:cNvPr>
@@ -6361,89 +7292,23 @@
         </p:nvSpPr>
         <p:spPr>
           <a:xfrm>
-            <a:off x="5934110" y="1289952"/>
-            <a:ext cx="4962490" cy="4278094"/>
+            <a:off x="2607179" y="5639351"/>
+            <a:ext cx="6051593" cy="369332"/>
           </a:xfrm>
           <a:prstGeom prst="rect">
             <a:avLst/>
           </a:prstGeom>
           <a:noFill/>
-          <a:ln w="38100">
-            <a:solidFill>
-              <a:schemeClr val="tx1"/>
-            </a:solidFill>
-          </a:ln>
         </p:spPr>
         <p:txBody>
-          <a:bodyPr wrap="square" rtlCol="0">
+          <a:bodyPr wrap="none" rtlCol="0">
             <a:spAutoFit/>
           </a:bodyPr>
           <a:lstStyle/>
           <a:p>
             <a:r>
-              <a:rPr lang="en-US" sz="3200" b="1" dirty="0"/>
-              <a:t>HTML (home.html)</a:t>
-            </a:r>
-            <a:endParaRPr lang="en-US" sz="2400" b="1" dirty="0"/>
-          </a:p>
-          <a:p>
-            <a:r>
-              <a:rPr lang="en-US" sz="2400" dirty="0"/>
-              <a:t>&lt;div id="store"&gt;</a:t>
-            </a:r>
-          </a:p>
-          <a:p>
-            <a:r>
-              <a:rPr lang="en-US" sz="2400" dirty="0"/>
-              <a:t>    &lt;!-- blue hat item container --&gt;</a:t>
-            </a:r>
-          </a:p>
-          <a:p>
-            <a:r>
-              <a:rPr lang="en-US" sz="2400" dirty="0"/>
-              <a:t>    &lt;!-- blue pillow item container --&gt;</a:t>
-            </a:r>
-          </a:p>
-          <a:p>
-            <a:r>
-              <a:rPr lang="en-US" sz="2400" dirty="0"/>
-              <a:t>    &lt;!-- blue pants item container --&gt;</a:t>
-            </a:r>
-          </a:p>
-          <a:p>
-            <a:r>
-              <a:rPr lang="en-US" sz="2400" dirty="0"/>
-              <a:t>    &lt;!-- orange hat item container --&gt;</a:t>
-            </a:r>
-          </a:p>
-          <a:p>
-            <a:r>
-              <a:rPr lang="en-US" sz="2400" dirty="0"/>
-              <a:t>    &lt;!-- orange pillow item container --&gt;</a:t>
-            </a:r>
-          </a:p>
-          <a:p>
-            <a:r>
-              <a:rPr lang="en-US" sz="2400" dirty="0"/>
-              <a:t>    &lt;!-- orange pants item container --&gt;</a:t>
-            </a:r>
-          </a:p>
-          <a:p>
-            <a:r>
-              <a:rPr lang="en-US" sz="2400" dirty="0"/>
-              <a:t>    &lt;!-- white hat item container --&gt;</a:t>
-            </a:r>
-          </a:p>
-          <a:p>
-            <a:r>
-              <a:rPr lang="en-US" sz="2400" dirty="0"/>
-              <a:t>    &lt;!-- white pillow item container --&gt;</a:t>
-            </a:r>
-          </a:p>
-          <a:p>
-            <a:r>
-              <a:rPr lang="en-US" sz="2400" dirty="0"/>
-              <a:t>&lt;/div&gt;</a:t>
+              <a:rPr lang="en-US" dirty="0"/>
+              <a:t>Combine New, Sale, and Regular Items in an organized manner</a:t>
             </a:r>
           </a:p>
         </p:txBody>
@@ -6451,7 +7316,7 @@
     </p:spTree>
     <p:extLst>
       <p:ext uri="{BB962C8B-B14F-4D97-AF65-F5344CB8AC3E}">
-        <p14:creationId xmlns:p14="http://schemas.microsoft.com/office/powerpoint/2010/main" val="597301176"/>
+        <p14:creationId xmlns:p14="http://schemas.microsoft.com/office/powerpoint/2010/main" val="1545583649"/>
       </p:ext>
     </p:extLst>
   </p:cSld>
@@ -6494,14 +7359,19 @@
             <p:ph type="title"/>
           </p:nvPr>
         </p:nvSpPr>
-        <p:spPr/>
+        <p:spPr>
+          <a:xfrm>
+            <a:off x="-47590" y="-2969"/>
+            <a:ext cx="10515600" cy="1325563"/>
+          </a:xfrm>
+        </p:spPr>
         <p:txBody>
           <a:bodyPr/>
           <a:lstStyle/>
           <a:p>
             <a:r>
               <a:rPr lang="en-US" dirty="0"/>
-              <a:t>Day 4: Create the Header</a:t>
+              <a:t>Day 3: Create The “All Items” Display </a:t>
             </a:r>
           </a:p>
         </p:txBody>
@@ -6522,13 +7392,13 @@
         </p:nvPicPr>
         <p:blipFill rotWithShape="1">
           <a:blip r:embed="rId2"/>
-          <a:srcRect b="85317"/>
+          <a:srcRect l="908" t="17327"/>
           <a:stretch/>
         </p:blipFill>
         <p:spPr>
           <a:xfrm>
-            <a:off x="741028" y="1690688"/>
-            <a:ext cx="10709944" cy="725341"/>
+            <a:off x="178966" y="1386927"/>
+            <a:ext cx="5634605" cy="4084145"/>
           </a:xfrm>
           <a:prstGeom prst="rect">
             <a:avLst/>
@@ -6537,10 +7407,10 @@
       </p:pic>
       <p:sp>
         <p:nvSpPr>
-          <p:cNvPr id="5" name="TextBox 4">
-            <a:extLst>
-              <a:ext uri="{FF2B5EF4-FFF2-40B4-BE49-F238E27FC236}">
-                <a16:creationId xmlns:a16="http://schemas.microsoft.com/office/drawing/2014/main" id="{9E77DCF6-B70A-4118-BC45-9CC18EFA815C}"/>
+          <p:cNvPr id="7" name="TextBox 6">
+            <a:extLst>
+              <a:ext uri="{FF2B5EF4-FFF2-40B4-BE49-F238E27FC236}">
+                <a16:creationId xmlns:a16="http://schemas.microsoft.com/office/drawing/2014/main" id="{C921E6A5-0A7D-4457-8B3D-4244D3F6CE73}"/>
               </a:ext>
             </a:extLst>
           </p:cNvPr>
@@ -6549,23 +7419,89 @@
         </p:nvSpPr>
         <p:spPr>
           <a:xfrm>
-            <a:off x="741028" y="2776756"/>
-            <a:ext cx="5849358" cy="369332"/>
+            <a:off x="5934110" y="1289952"/>
+            <a:ext cx="4962490" cy="4278094"/>
           </a:xfrm>
           <a:prstGeom prst="rect">
             <a:avLst/>
           </a:prstGeom>
           <a:noFill/>
+          <a:ln w="38100">
+            <a:solidFill>
+              <a:schemeClr val="tx1"/>
+            </a:solidFill>
+          </a:ln>
         </p:spPr>
         <p:txBody>
-          <a:bodyPr wrap="none" rtlCol="0">
+          <a:bodyPr wrap="square" rtlCol="0">
             <a:spAutoFit/>
           </a:bodyPr>
           <a:lstStyle/>
           <a:p>
             <a:r>
-              <a:rPr lang="en-US" dirty="0"/>
-              <a:t>A tab for each page that navigates to that page upon clicking</a:t>
+              <a:rPr lang="en-US" sz="3200" b="1" dirty="0"/>
+              <a:t>HTML (home.html)</a:t>
+            </a:r>
+            <a:endParaRPr lang="en-US" sz="2400" b="1" dirty="0"/>
+          </a:p>
+          <a:p>
+            <a:r>
+              <a:rPr lang="en-US" sz="2400" dirty="0"/>
+              <a:t>&lt;div id="store"&gt;</a:t>
+            </a:r>
+          </a:p>
+          <a:p>
+            <a:r>
+              <a:rPr lang="en-US" sz="2400" dirty="0"/>
+              <a:t>    &lt;!-- blue hat item container --&gt;</a:t>
+            </a:r>
+          </a:p>
+          <a:p>
+            <a:r>
+              <a:rPr lang="en-US" sz="2400" dirty="0"/>
+              <a:t>    &lt;!-- blue pillow item container --&gt;</a:t>
+            </a:r>
+          </a:p>
+          <a:p>
+            <a:r>
+              <a:rPr lang="en-US" sz="2400" dirty="0"/>
+              <a:t>    &lt;!-- blue pants item container --&gt;</a:t>
+            </a:r>
+          </a:p>
+          <a:p>
+            <a:r>
+              <a:rPr lang="en-US" sz="2400" dirty="0"/>
+              <a:t>    &lt;!-- orange hat item container --&gt;</a:t>
+            </a:r>
+          </a:p>
+          <a:p>
+            <a:r>
+              <a:rPr lang="en-US" sz="2400" dirty="0"/>
+              <a:t>    &lt;!-- orange pillow item container --&gt;</a:t>
+            </a:r>
+          </a:p>
+          <a:p>
+            <a:r>
+              <a:rPr lang="en-US" sz="2400" dirty="0"/>
+              <a:t>    &lt;!-- orange pants item container --&gt;</a:t>
+            </a:r>
+          </a:p>
+          <a:p>
+            <a:r>
+              <a:rPr lang="en-US" sz="2400" dirty="0"/>
+              <a:t>    &lt;!-- white hat item container --&gt;</a:t>
+            </a:r>
+          </a:p>
+          <a:p>
+            <a:r>
+              <a:rPr lang="en-US" sz="2400" dirty="0"/>
+              <a:t>    &lt;!-- white pillow item container --&gt;</a:t>
+            </a:r>
+          </a:p>
+          <a:p>
+            <a:r>
+              <a:rPr lang="en-US" sz="2400" dirty="0"/>
+              <a:t>&lt;/div&gt;</a:t>
             </a:r>
           </a:p>
         </p:txBody>
@@ -6573,7 +7509,7 @@
     </p:spTree>
     <p:extLst>
       <p:ext uri="{BB962C8B-B14F-4D97-AF65-F5344CB8AC3E}">
-        <p14:creationId xmlns:p14="http://schemas.microsoft.com/office/powerpoint/2010/main" val="1152250863"/>
+        <p14:creationId xmlns:p14="http://schemas.microsoft.com/office/powerpoint/2010/main" val="597301176"/>
       </p:ext>
     </p:extLst>
   </p:cSld>
@@ -6616,29 +7552,24 @@
             <p:ph type="title"/>
           </p:nvPr>
         </p:nvSpPr>
-        <p:spPr>
-          <a:xfrm>
-            <a:off x="131428" y="79375"/>
-            <a:ext cx="10515600" cy="1325563"/>
-          </a:xfrm>
-        </p:spPr>
+        <p:spPr/>
         <p:txBody>
           <a:bodyPr/>
           <a:lstStyle/>
           <a:p>
             <a:r>
               <a:rPr lang="en-US" dirty="0"/>
-              <a:t>Day 4: Create the Header</a:t>
+              <a:t>Day 4: Create the “New” and “Sale” Pages</a:t>
             </a:r>
           </a:p>
         </p:txBody>
       </p:sp>
       <p:pic>
         <p:nvPicPr>
-          <p:cNvPr id="4" name="Picture 3">
-            <a:extLst>
-              <a:ext uri="{FF2B5EF4-FFF2-40B4-BE49-F238E27FC236}">
-                <a16:creationId xmlns:a16="http://schemas.microsoft.com/office/drawing/2014/main" id="{E23F4A1F-72C7-4ADF-B7C1-B1F374F8A8BB}"/>
+          <p:cNvPr id="5" name="Picture 4">
+            <a:extLst>
+              <a:ext uri="{FF2B5EF4-FFF2-40B4-BE49-F238E27FC236}">
+                <a16:creationId xmlns:a16="http://schemas.microsoft.com/office/drawing/2014/main" id="{0BE2251C-899B-4125-BA01-392020058228}"/>
               </a:ext>
             </a:extLst>
           </p:cNvPr>
@@ -6649,473 +7580,52 @@
         </p:nvPicPr>
         <p:blipFill rotWithShape="1">
           <a:blip r:embed="rId2"/>
-          <a:srcRect r="47955" b="85317"/>
+          <a:srcRect t="25902"/>
           <a:stretch/>
         </p:blipFill>
         <p:spPr>
           <a:xfrm>
-            <a:off x="131428" y="1042267"/>
-            <a:ext cx="5574047" cy="725341"/>
+            <a:off x="900418" y="2105637"/>
+            <a:ext cx="10391164" cy="1824986"/>
           </a:xfrm>
           <a:prstGeom prst="rect">
             <a:avLst/>
           </a:prstGeom>
         </p:spPr>
       </p:pic>
-      <p:sp>
-        <p:nvSpPr>
-          <p:cNvPr id="6" name="TextBox 5">
-            <a:extLst>
-              <a:ext uri="{FF2B5EF4-FFF2-40B4-BE49-F238E27FC236}">
-                <a16:creationId xmlns:a16="http://schemas.microsoft.com/office/drawing/2014/main" id="{86EF8CE6-4AD3-4B21-B676-767587239E6D}"/>
-              </a:ext>
-            </a:extLst>
-          </p:cNvPr>
-          <p:cNvSpPr txBox="1"/>
+      <p:pic>
+        <p:nvPicPr>
+          <p:cNvPr id="6" name="Picture 5">
+            <a:extLst>
+              <a:ext uri="{FF2B5EF4-FFF2-40B4-BE49-F238E27FC236}">
+                <a16:creationId xmlns:a16="http://schemas.microsoft.com/office/drawing/2014/main" id="{49B34222-9073-4EFC-93E1-490D8AE958A1}"/>
+              </a:ext>
+            </a:extLst>
+          </p:cNvPr>
+          <p:cNvPicPr>
+            <a:picLocks noChangeAspect="1"/>
+          </p:cNvPicPr>
           <p:nvPr/>
-        </p:nvSpPr>
+        </p:nvPicPr>
+        <p:blipFill rotWithShape="1">
+          <a:blip r:embed="rId3"/>
+          <a:srcRect t="25071"/>
+          <a:stretch/>
+        </p:blipFill>
         <p:spPr>
           <a:xfrm>
-            <a:off x="699061" y="1811185"/>
-            <a:ext cx="4438779" cy="4955203"/>
+            <a:off x="900418" y="4664278"/>
+            <a:ext cx="10391164" cy="1935259"/>
           </a:xfrm>
           <a:prstGeom prst="rect">
             <a:avLst/>
           </a:prstGeom>
-          <a:noFill/>
-          <a:ln w="38100">
-            <a:solidFill>
-              <a:schemeClr val="tx1"/>
-            </a:solidFill>
-          </a:ln>
         </p:spPr>
-        <p:txBody>
-          <a:bodyPr wrap="none" rtlCol="0">
-            <a:spAutoFit/>
-          </a:bodyPr>
-          <a:lstStyle/>
-          <a:p>
-            <a:r>
-              <a:rPr lang="en-US" sz="2800" b="1" dirty="0"/>
-              <a:t>HTML (every html file)</a:t>
-            </a:r>
-            <a:endParaRPr lang="en-US" sz="1600" b="1" dirty="0"/>
-          </a:p>
-          <a:p>
-            <a:r>
-              <a:rPr lang="en-US" sz="1600" dirty="0"/>
-              <a:t>&lt;header&gt;</a:t>
-            </a:r>
-          </a:p>
-          <a:p>
-            <a:r>
-              <a:rPr lang="en-US" sz="1600" dirty="0"/>
-              <a:t>        &lt;link </a:t>
-            </a:r>
-            <a:r>
-              <a:rPr lang="en-US" sz="1600" dirty="0" err="1"/>
-              <a:t>rel</a:t>
-            </a:r>
-            <a:r>
-              <a:rPr lang="en-US" sz="1600" dirty="0"/>
-              <a:t>="stylesheet" </a:t>
-            </a:r>
-            <a:r>
-              <a:rPr lang="en-US" sz="1600" dirty="0" err="1"/>
-              <a:t>href</a:t>
-            </a:r>
-            <a:r>
-              <a:rPr lang="en-US" sz="1600" dirty="0"/>
-              <a:t>="assets/styles.css"&gt;</a:t>
-            </a:r>
-          </a:p>
-          <a:p>
-            <a:r>
-              <a:rPr lang="en-US" sz="1600" dirty="0"/>
-              <a:t>        &lt;ul&gt;</a:t>
-            </a:r>
-          </a:p>
-          <a:p>
-            <a:r>
-              <a:rPr lang="en-US" sz="1600" dirty="0"/>
-              <a:t>            &lt;span&gt; Bearcat School Store &lt;/span&gt;</a:t>
-            </a:r>
-          </a:p>
-          <a:p>
-            <a:r>
-              <a:rPr lang="en-US" sz="1600" dirty="0"/>
-              <a:t>            &lt;a </a:t>
-            </a:r>
-            <a:r>
-              <a:rPr lang="en-US" sz="1600" dirty="0" err="1"/>
-              <a:t>href</a:t>
-            </a:r>
-            <a:r>
-              <a:rPr lang="en-US" sz="1600" dirty="0"/>
-              <a:t>="./index"&gt;</a:t>
-            </a:r>
-          </a:p>
-          <a:p>
-            <a:r>
-              <a:rPr lang="en-US" sz="1600" dirty="0"/>
-              <a:t>           &lt;li&gt;Home&lt;/li&gt;</a:t>
-            </a:r>
-          </a:p>
-          <a:p>
-            <a:r>
-              <a:rPr lang="en-US" sz="1600" dirty="0"/>
-              <a:t>            &lt;/a&gt;</a:t>
-            </a:r>
-          </a:p>
-          <a:p>
-            <a:r>
-              <a:rPr lang="en-US" sz="1600" dirty="0"/>
-              <a:t>            &lt;a </a:t>
-            </a:r>
-            <a:r>
-              <a:rPr lang="en-US" sz="1600" dirty="0" err="1"/>
-              <a:t>href</a:t>
-            </a:r>
-            <a:r>
-              <a:rPr lang="en-US" sz="1600" dirty="0"/>
-              <a:t>="./new"&gt;</a:t>
-            </a:r>
-          </a:p>
-          <a:p>
-            <a:r>
-              <a:rPr lang="en-US" sz="1600" dirty="0"/>
-              <a:t>                &lt;li&gt;New&lt;/li&gt;</a:t>
-            </a:r>
-          </a:p>
-          <a:p>
-            <a:r>
-              <a:rPr lang="en-US" sz="1600" dirty="0"/>
-              <a:t>            &lt;/a&gt;</a:t>
-            </a:r>
-          </a:p>
-          <a:p>
-            <a:r>
-              <a:rPr lang="en-US" sz="1600" dirty="0"/>
-              <a:t>            &lt;a </a:t>
-            </a:r>
-            <a:r>
-              <a:rPr lang="en-US" sz="1600" dirty="0" err="1"/>
-              <a:t>href</a:t>
-            </a:r>
-            <a:r>
-              <a:rPr lang="en-US" sz="1600" dirty="0"/>
-              <a:t>="./sale"&gt;</a:t>
-            </a:r>
-          </a:p>
-          <a:p>
-            <a:r>
-              <a:rPr lang="en-US" sz="1600" dirty="0"/>
-              <a:t>                &lt;li&gt;On Sale&lt;/li&gt;</a:t>
-            </a:r>
-          </a:p>
-          <a:p>
-            <a:r>
-              <a:rPr lang="en-US" sz="1600" dirty="0"/>
-              <a:t>            &lt;/a&gt;</a:t>
-            </a:r>
-          </a:p>
-          <a:p>
-            <a:r>
-              <a:rPr lang="en-US" sz="1600" dirty="0"/>
-              <a:t>            &lt;a </a:t>
-            </a:r>
-            <a:r>
-              <a:rPr lang="en-US" sz="1600" dirty="0" err="1"/>
-              <a:t>href</a:t>
-            </a:r>
-            <a:r>
-              <a:rPr lang="en-US" sz="1600" dirty="0"/>
-              <a:t>="./contact"&gt;</a:t>
-            </a:r>
-          </a:p>
-          <a:p>
-            <a:r>
-              <a:rPr lang="en-US" sz="1600" dirty="0"/>
-              <a:t>                &lt;li&gt;Contact&lt;/li&gt;</a:t>
-            </a:r>
-          </a:p>
-          <a:p>
-            <a:r>
-              <a:rPr lang="en-US" sz="1600" dirty="0"/>
-              <a:t>            &lt;/a&gt;</a:t>
-            </a:r>
-          </a:p>
-          <a:p>
-            <a:r>
-              <a:rPr lang="en-US" sz="1600" dirty="0"/>
-              <a:t>        &lt;/ul&gt;</a:t>
-            </a:r>
-          </a:p>
-          <a:p>
-            <a:r>
-              <a:rPr lang="en-US" sz="1600" dirty="0"/>
-              <a:t>&lt;/header&gt;</a:t>
-            </a:r>
-          </a:p>
-        </p:txBody>
-      </p:sp>
-      <p:sp>
-        <p:nvSpPr>
-          <p:cNvPr id="7" name="TextBox 6">
-            <a:extLst>
-              <a:ext uri="{FF2B5EF4-FFF2-40B4-BE49-F238E27FC236}">
-                <a16:creationId xmlns:a16="http://schemas.microsoft.com/office/drawing/2014/main" id="{B8406C72-39BC-432F-84B2-461F0AAC166B}"/>
-              </a:ext>
-            </a:extLst>
-          </p:cNvPr>
-          <p:cNvSpPr txBox="1"/>
-          <p:nvPr/>
-        </p:nvSpPr>
-        <p:spPr>
-          <a:xfrm>
-            <a:off x="7332328" y="335845"/>
-            <a:ext cx="4251998" cy="6186309"/>
-          </a:xfrm>
-          <a:prstGeom prst="rect">
-            <a:avLst/>
-          </a:prstGeom>
-          <a:noFill/>
-          <a:ln w="38100">
-            <a:solidFill>
-              <a:schemeClr val="tx1"/>
-            </a:solidFill>
-          </a:ln>
-        </p:spPr>
-        <p:txBody>
-          <a:bodyPr wrap="none" rtlCol="0">
-            <a:spAutoFit/>
-          </a:bodyPr>
-          <a:lstStyle/>
-          <a:p>
-            <a:r>
-              <a:rPr lang="en-US" sz="2800" b="1" dirty="0"/>
-              <a:t>CSS </a:t>
-            </a:r>
-            <a:r>
-              <a:rPr lang="en-US" sz="2000" b="1" dirty="0"/>
-              <a:t>(styles.css)</a:t>
-            </a:r>
-            <a:endParaRPr lang="en-US" sz="1200" dirty="0"/>
-          </a:p>
-          <a:p>
-            <a:r>
-              <a:rPr lang="en-US" sz="1600" dirty="0"/>
-              <a:t>ul{</a:t>
-            </a:r>
-          </a:p>
-          <a:p>
-            <a:r>
-              <a:rPr lang="en-US" sz="1600" dirty="0"/>
-              <a:t>    background-color: </a:t>
-            </a:r>
-            <a:r>
-              <a:rPr lang="en-US" sz="1600" dirty="0" err="1"/>
-              <a:t>rgb</a:t>
-            </a:r>
-            <a:r>
-              <a:rPr lang="en-US" sz="1600" dirty="0"/>
-              <a:t>(27, 27, 27);</a:t>
-            </a:r>
-          </a:p>
-          <a:p>
-            <a:r>
-              <a:rPr lang="en-US" sz="1600" dirty="0"/>
-              <a:t>    padding: 2%;</a:t>
-            </a:r>
-          </a:p>
-          <a:p>
-            <a:r>
-              <a:rPr lang="en-US" sz="1600" dirty="0"/>
-              <a:t>}</a:t>
-            </a:r>
-            <a:br>
-              <a:rPr lang="en-US" sz="1600" dirty="0"/>
-            </a:br>
-            <a:r>
-              <a:rPr lang="en-US" sz="1600" dirty="0"/>
-              <a:t>li{</a:t>
-            </a:r>
-          </a:p>
-          <a:p>
-            <a:r>
-              <a:rPr lang="en-US" sz="1600" dirty="0"/>
-              <a:t>    display: inline;</a:t>
-            </a:r>
-          </a:p>
-          <a:p>
-            <a:r>
-              <a:rPr lang="en-US" sz="1600" dirty="0"/>
-              <a:t>    padding: 2%;</a:t>
-            </a:r>
-          </a:p>
-          <a:p>
-            <a:r>
-              <a:rPr lang="en-US" sz="1600" dirty="0"/>
-              <a:t>    color: </a:t>
-            </a:r>
-            <a:r>
-              <a:rPr lang="en-US" sz="1600" dirty="0" err="1"/>
-              <a:t>lightblue</a:t>
-            </a:r>
-            <a:r>
-              <a:rPr lang="en-US" sz="1600" dirty="0"/>
-              <a:t>;</a:t>
-            </a:r>
-          </a:p>
-          <a:p>
-            <a:r>
-              <a:rPr lang="en-US" sz="1600" dirty="0"/>
-              <a:t>    font-size: x-large;</a:t>
-            </a:r>
-          </a:p>
-          <a:p>
-            <a:r>
-              <a:rPr lang="en-US" sz="1600" dirty="0"/>
-              <a:t>    text-shadow: 2px </a:t>
-            </a:r>
-            <a:r>
-              <a:rPr lang="en-US" sz="1600" dirty="0" err="1"/>
-              <a:t>2px</a:t>
-            </a:r>
-            <a:r>
-              <a:rPr lang="en-US" sz="1600" dirty="0"/>
-              <a:t> blue;</a:t>
-            </a:r>
-          </a:p>
-          <a:p>
-            <a:r>
-              <a:rPr lang="en-US" sz="1600" dirty="0"/>
-              <a:t>    font-weight: bold;</a:t>
-            </a:r>
-          </a:p>
-          <a:p>
-            <a:r>
-              <a:rPr lang="en-US" sz="1600" dirty="0"/>
-              <a:t>    text-decoration: none;</a:t>
-            </a:r>
-          </a:p>
-          <a:p>
-            <a:r>
-              <a:rPr lang="en-US" sz="1600" dirty="0"/>
-              <a:t>}</a:t>
-            </a:r>
-          </a:p>
-          <a:p>
-            <a:r>
-              <a:rPr lang="en-US" sz="1600" dirty="0" err="1"/>
-              <a:t>li:hover</a:t>
-            </a:r>
-            <a:r>
-              <a:rPr lang="en-US" sz="1600" dirty="0"/>
-              <a:t>{ </a:t>
-            </a:r>
-            <a:r>
-              <a:rPr lang="en-US" sz="1600" dirty="0" err="1"/>
-              <a:t>background-color:slategrey</a:t>
-            </a:r>
-            <a:r>
-              <a:rPr lang="en-US" sz="1600" dirty="0"/>
-              <a:t>; }</a:t>
-            </a:r>
-          </a:p>
-          <a:p>
-            <a:r>
-              <a:rPr lang="en-US" sz="1600" dirty="0"/>
-              <a:t>a{ text-decoration: none; }</a:t>
-            </a:r>
-          </a:p>
-          <a:p>
-            <a:r>
-              <a:rPr lang="en-US" sz="1600" dirty="0"/>
-              <a:t>span{</a:t>
-            </a:r>
-          </a:p>
-          <a:p>
-            <a:r>
-              <a:rPr lang="en-US" sz="1600" dirty="0"/>
-              <a:t>    color: </a:t>
-            </a:r>
-            <a:r>
-              <a:rPr lang="en-US" sz="1600" dirty="0" err="1"/>
-              <a:t>peachpuff</a:t>
-            </a:r>
-            <a:r>
-              <a:rPr lang="en-US" sz="1600" dirty="0"/>
-              <a:t>;</a:t>
-            </a:r>
-          </a:p>
-          <a:p>
-            <a:r>
-              <a:rPr lang="en-US" sz="1600" dirty="0"/>
-              <a:t>    font-size: xx-large;</a:t>
-            </a:r>
-          </a:p>
-          <a:p>
-            <a:r>
-              <a:rPr lang="en-US" sz="1600" dirty="0"/>
-              <a:t>    font-weight: bolder;</a:t>
-            </a:r>
-          </a:p>
-          <a:p>
-            <a:r>
-              <a:rPr lang="en-US" sz="1600" dirty="0"/>
-              <a:t>    </a:t>
-            </a:r>
-            <a:r>
-              <a:rPr lang="en-US" sz="1600" dirty="0" err="1"/>
-              <a:t>cursor:no-drop</a:t>
-            </a:r>
-            <a:r>
-              <a:rPr lang="en-US" sz="1600" dirty="0"/>
-              <a:t>;</a:t>
-            </a:r>
-          </a:p>
-          <a:p>
-            <a:r>
-              <a:rPr lang="en-US" sz="1600" dirty="0"/>
-              <a:t>    text-shadow: 2px </a:t>
-            </a:r>
-            <a:r>
-              <a:rPr lang="en-US" sz="1600" dirty="0" err="1"/>
-              <a:t>2px</a:t>
-            </a:r>
-            <a:r>
-              <a:rPr lang="en-US" sz="1600" dirty="0"/>
-              <a:t> </a:t>
-            </a:r>
-            <a:r>
-              <a:rPr lang="en-US" sz="1600" dirty="0" err="1"/>
-              <a:t>orangered</a:t>
-            </a:r>
-            <a:r>
-              <a:rPr lang="en-US" sz="1600" dirty="0"/>
-              <a:t>;</a:t>
-            </a:r>
-          </a:p>
-          <a:p>
-            <a:r>
-              <a:rPr lang="en-US" sz="1600" dirty="0"/>
-              <a:t>}</a:t>
-            </a:r>
-            <a:br>
-              <a:rPr lang="en-US" sz="1600" dirty="0"/>
-            </a:br>
-            <a:r>
-              <a:rPr lang="en-US" sz="1600" dirty="0"/>
-              <a:t>span::selection{ background-color: transparent; }</a:t>
-            </a:r>
-          </a:p>
-        </p:txBody>
-      </p:sp>
+      </p:pic>
     </p:spTree>
     <p:extLst>
       <p:ext uri="{BB962C8B-B14F-4D97-AF65-F5344CB8AC3E}">
-        <p14:creationId xmlns:p14="http://schemas.microsoft.com/office/powerpoint/2010/main" val="4197318355"/>
+        <p14:creationId xmlns:p14="http://schemas.microsoft.com/office/powerpoint/2010/main" val="1597390541"/>
       </p:ext>
     </p:extLst>
   </p:cSld>
@@ -7583,18 +8093,18 @@
 </file>
 
 <file path=customXml/item2.xml><?xml version="1.0" encoding="utf-8"?>
+<p:properties xmlns:p="http://schemas.microsoft.com/office/2006/metadata/properties" xmlns:xsi="http://www.w3.org/2001/XMLSchema-instance" xmlns:pc="http://schemas.microsoft.com/office/infopath/2007/PartnerControls">
+  <documentManagement/>
+</p:properties>
+</file>
+
+<file path=customXml/item3.xml><?xml version="1.0" encoding="utf-8"?>
 <?mso-contentType ?>
 <FormTemplates xmlns="http://schemas.microsoft.com/sharepoint/v3/contenttype/forms">
   <Display>DocumentLibraryForm</Display>
   <Edit>DocumentLibraryForm</Edit>
   <New>DocumentLibraryForm</New>
 </FormTemplates>
-</file>
-
-<file path=customXml/item3.xml><?xml version="1.0" encoding="utf-8"?>
-<p:properties xmlns:p="http://schemas.microsoft.com/office/2006/metadata/properties" xmlns:xsi="http://www.w3.org/2001/XMLSchema-instance" xmlns:pc="http://schemas.microsoft.com/office/infopath/2007/PartnerControls">
-  <documentManagement/>
-</p:properties>
 </file>
 
 <file path=customXml/itemProps1.xml><?xml version="1.0" encoding="utf-8"?>
@@ -7616,25 +8126,25 @@
 </file>
 
 <file path=customXml/itemProps2.xml><?xml version="1.0" encoding="utf-8"?>
+<ds:datastoreItem xmlns:ds="http://schemas.openxmlformats.org/officeDocument/2006/customXml" ds:itemID="{DB871C48-42D6-46C3-9B5F-6F3B89F20340}">
+  <ds:schemaRefs>
+    <ds:schemaRef ds:uri="http://schemas.microsoft.com/office/infopath/2007/PartnerControls"/>
+    <ds:schemaRef ds:uri="http://purl.org/dc/elements/1.1/"/>
+    <ds:schemaRef ds:uri="http://schemas.microsoft.com/office/2006/metadata/properties"/>
+    <ds:schemaRef ds:uri="8c07c512-1ff3-44bd-87df-82ef976e112f"/>
+    <ds:schemaRef ds:uri="http://purl.org/dc/terms/"/>
+    <ds:schemaRef ds:uri="http://schemas.microsoft.com/office/2006/documentManagement/types"/>
+    <ds:schemaRef ds:uri="http://purl.org/dc/dcmitype/"/>
+    <ds:schemaRef ds:uri="http://schemas.openxmlformats.org/package/2006/metadata/core-properties"/>
+    <ds:schemaRef ds:uri="http://www.w3.org/XML/1998/namespace"/>
+  </ds:schemaRefs>
+</ds:datastoreItem>
+</file>
+
+<file path=customXml/itemProps3.xml><?xml version="1.0" encoding="utf-8"?>
 <ds:datastoreItem xmlns:ds="http://schemas.openxmlformats.org/officeDocument/2006/customXml" ds:itemID="{6671402B-9172-4E85-AD40-2DB2425472AA}">
   <ds:schemaRefs>
     <ds:schemaRef ds:uri="http://schemas.microsoft.com/sharepoint/v3/contenttype/forms"/>
   </ds:schemaRefs>
 </ds:datastoreItem>
-</file>
-
-<file path=customXml/itemProps3.xml><?xml version="1.0" encoding="utf-8"?>
-<ds:datastoreItem xmlns:ds="http://schemas.openxmlformats.org/officeDocument/2006/customXml" ds:itemID="{DB871C48-42D6-46C3-9B5F-6F3B89F20340}">
-  <ds:schemaRefs>
-    <ds:schemaRef ds:uri="8c07c512-1ff3-44bd-87df-82ef976e112f"/>
-    <ds:schemaRef ds:uri="http://purl.org/dc/terms/"/>
-    <ds:schemaRef ds:uri="http://schemas.openxmlformats.org/package/2006/metadata/core-properties"/>
-    <ds:schemaRef ds:uri="http://purl.org/dc/dcmitype/"/>
-    <ds:schemaRef ds:uri="http://schemas.microsoft.com/office/infopath/2007/PartnerControls"/>
-    <ds:schemaRef ds:uri="http://schemas.microsoft.com/office/2006/documentManagement/types"/>
-    <ds:schemaRef ds:uri="http://purl.org/dc/elements/1.1/"/>
-    <ds:schemaRef ds:uri="http://schemas.microsoft.com/office/2006/metadata/properties"/>
-    <ds:schemaRef ds:uri="http://www.w3.org/XML/1998/namespace"/>
-  </ds:schemaRefs>
-</ds:datastoreItem>
 </file>
</xml_diff>